<commit_message>
Separate builds for application installer and master builder.
</commit_message>
<xml_diff>
--- a/MasterBuilder.pptx
+++ b/MasterBuilder.pptx
@@ -5,13 +5,14 @@
     <p:sldMasterId id="2147483649" r:id="rId1"/>
   </p:sldMasterIdLst>
   <p:notesMasterIdLst>
-    <p:notesMasterId r:id="rId6"/>
+    <p:notesMasterId r:id="rId7"/>
   </p:notesMasterIdLst>
   <p:sldIdLst>
     <p:sldId id="301" r:id="rId2"/>
     <p:sldId id="325" r:id="rId3"/>
     <p:sldId id="327" r:id="rId4"/>
-    <p:sldId id="326" r:id="rId5"/>
+    <p:sldId id="328" r:id="rId5"/>
+    <p:sldId id="326" r:id="rId6"/>
   </p:sldIdLst>
   <p:sldSz cx="9144000" cy="6858000" type="screen4x3"/>
   <p:notesSz cx="7315200" cy="9601200"/>
@@ -428,7 +429,7 @@
         <p:nvSpPr>
           <p:cNvPr id="13319" name="Rectangle 6"/>
           <p:cNvSpPr>
-            <a:spLocks noGrp="1" noChangeArrowheads="1"/>
+            <a:spLocks noGrp="1" noRot="1" noChangeAspect="1" noChangeArrowheads="1"/>
           </p:cNvSpPr>
           <p:nvPr>
             <p:ph type="sldImg"/>
@@ -1074,7 +1075,7 @@
         <p:nvSpPr>
           <p:cNvPr id="16387" name="Rectangle 1"/>
           <p:cNvSpPr>
-            <a:spLocks noChangeArrowheads="1" noTextEdit="1"/>
+            <a:spLocks noGrp="1" noRot="1" noChangeAspect="1" noChangeArrowheads="1" noTextEdit="1"/>
           </p:cNvSpPr>
           <p:nvPr>
             <p:ph type="sldImg"/>
@@ -1440,7 +1441,373 @@
         <p:nvSpPr>
           <p:cNvPr id="18435" name="Rectangle 1"/>
           <p:cNvSpPr>
-            <a:spLocks noChangeArrowheads="1" noTextEdit="1"/>
+            <a:spLocks noGrp="1" noRot="1" noChangeAspect="1" noChangeArrowheads="1" noTextEdit="1"/>
+          </p:cNvSpPr>
+          <p:nvPr>
+            <p:ph type="sldImg"/>
+          </p:nvPr>
+        </p:nvSpPr>
+        <p:spPr>
+          <a:xfrm>
+            <a:off x="1257300" y="720725"/>
+            <a:ext cx="4800600" cy="3600450"/>
+          </a:xfrm>
+          <a:solidFill>
+            <a:srgbClr val="FFFFFF"/>
+          </a:solidFill>
+          <a:ln/>
+        </p:spPr>
+      </p:sp>
+      <p:sp>
+        <p:nvSpPr>
+          <p:cNvPr id="18436" name="Text Box 2"/>
+          <p:cNvSpPr txBox="1">
+            <a:spLocks noChangeArrowheads="1"/>
+          </p:cNvSpPr>
+          <p:nvPr/>
+        </p:nvSpPr>
+        <p:spPr bwMode="auto">
+          <a:xfrm>
+            <a:off x="974725" y="4560888"/>
+            <a:ext cx="5365750" cy="4319587"/>
+          </a:xfrm>
+          <a:prstGeom prst="rect">
+            <a:avLst/>
+          </a:prstGeom>
+          <a:noFill/>
+          <a:ln>
+            <a:noFill/>
+          </a:ln>
+          <a:extLst>
+            <a:ext uri="{909E8E84-426E-40dd-AFC4-6F175D3DCCD1}">
+              <a14:hiddenFill xmlns:a14="http://schemas.microsoft.com/office/drawing/2010/main">
+                <a:solidFill>
+                  <a:srgbClr val="FFFFFF"/>
+                </a:solidFill>
+              </a14:hiddenFill>
+            </a:ext>
+            <a:ext uri="{91240B29-F687-4f45-9708-019B960494DF}">
+              <a14:hiddenLine xmlns:a14="http://schemas.microsoft.com/office/drawing/2010/main" w="9525">
+                <a:solidFill>
+                  <a:srgbClr val="000000"/>
+                </a:solidFill>
+                <a:round/>
+                <a:headEnd/>
+                <a:tailEnd/>
+              </a14:hiddenLine>
+            </a:ext>
+          </a:extLst>
+        </p:spPr>
+        <p:txBody>
+          <a:bodyPr wrap="none" anchor="ctr"/>
+          <a:lstStyle/>
+          <a:p>
+            <a:endParaRPr lang="en-US"/>
+          </a:p>
+        </p:txBody>
+      </p:sp>
+    </p:spTree>
+  </p:cSld>
+  <p:clrMapOvr>
+    <a:masterClrMapping/>
+  </p:clrMapOvr>
+</p:notes>
+</file>
+
+<file path=ppt/notesSlides/notesSlide3.xml><?xml version="1.0" encoding="utf-8"?>
+<p:notes xmlns:a="http://schemas.openxmlformats.org/drawingml/2006/main" xmlns:r="http://schemas.openxmlformats.org/officeDocument/2006/relationships" xmlns:p="http://schemas.openxmlformats.org/presentationml/2006/main">
+  <p:cSld>
+    <p:bg>
+      <p:bgPr>
+        <a:solidFill>
+          <a:srgbClr val="FFFFFF"/>
+        </a:solidFill>
+        <a:effectLst/>
+      </p:bgPr>
+    </p:bg>
+    <p:spTree>
+      <p:nvGrpSpPr>
+        <p:cNvPr id="1" name=""/>
+        <p:cNvGrpSpPr/>
+        <p:nvPr/>
+      </p:nvGrpSpPr>
+      <p:grpSpPr>
+        <a:xfrm>
+          <a:off x="0" y="0"/>
+          <a:ext cx="0" cy="0"/>
+          <a:chOff x="0" y="0"/>
+          <a:chExt cx="0" cy="0"/>
+        </a:xfrm>
+      </p:grpSpPr>
+      <p:sp>
+        <p:nvSpPr>
+          <p:cNvPr id="18434" name="Rectangle 9"/>
+          <p:cNvSpPr>
+            <a:spLocks noGrp="1" noChangeArrowheads="1"/>
+          </p:cNvSpPr>
+          <p:nvPr>
+            <p:ph type="sldNum" sz="quarter"/>
+          </p:nvPr>
+        </p:nvSpPr>
+        <p:spPr>
+          <a:noFill/>
+          <a:ln/>
+          <a:extLst>
+            <a:ext uri="{909E8E84-426E-40dd-AFC4-6F175D3DCCD1}">
+              <a14:hiddenFill xmlns:a14="http://schemas.microsoft.com/office/drawing/2010/main">
+                <a:solidFill>
+                  <a:srgbClr val="FFFFFF"/>
+                </a:solidFill>
+              </a14:hiddenFill>
+            </a:ext>
+            <a:ext uri="{91240B29-F687-4f45-9708-019B960494DF}">
+              <a14:hiddenLine xmlns:a14="http://schemas.microsoft.com/office/drawing/2010/main" w="9525">
+                <a:solidFill>
+                  <a:srgbClr val="000000"/>
+                </a:solidFill>
+                <a:round/>
+                <a:headEnd/>
+                <a:tailEnd/>
+              </a14:hiddenLine>
+            </a:ext>
+          </a:extLst>
+        </p:spPr>
+        <p:txBody>
+          <a:bodyPr/>
+          <a:lstStyle>
+            <a:lvl1pPr eaLnBrk="0" hangingPunct="0">
+              <a:tabLst>
+                <a:tab pos="457200" algn="l"/>
+                <a:tab pos="914400" algn="l"/>
+                <a:tab pos="1371600" algn="l"/>
+                <a:tab pos="1828800" algn="l"/>
+                <a:tab pos="2286000" algn="l"/>
+                <a:tab pos="2743200" algn="l"/>
+              </a:tabLst>
+              <a:defRPr sz="2400" b="1">
+                <a:solidFill>
+                  <a:schemeClr val="bg1"/>
+                </a:solidFill>
+                <a:latin typeface="Verdana" charset="0"/>
+                <a:ea typeface="Microsoft YaHei" charset="0"/>
+                <a:cs typeface="Microsoft YaHei" charset="0"/>
+              </a:defRPr>
+            </a:lvl1pPr>
+            <a:lvl2pPr eaLnBrk="0" hangingPunct="0">
+              <a:tabLst>
+                <a:tab pos="457200" algn="l"/>
+                <a:tab pos="914400" algn="l"/>
+                <a:tab pos="1371600" algn="l"/>
+                <a:tab pos="1828800" algn="l"/>
+                <a:tab pos="2286000" algn="l"/>
+                <a:tab pos="2743200" algn="l"/>
+              </a:tabLst>
+              <a:defRPr sz="2400" b="1">
+                <a:solidFill>
+                  <a:schemeClr val="bg1"/>
+                </a:solidFill>
+                <a:latin typeface="Verdana" charset="0"/>
+                <a:ea typeface="Microsoft YaHei" charset="0"/>
+                <a:cs typeface="Microsoft YaHei" charset="0"/>
+              </a:defRPr>
+            </a:lvl2pPr>
+            <a:lvl3pPr eaLnBrk="0" hangingPunct="0">
+              <a:tabLst>
+                <a:tab pos="457200" algn="l"/>
+                <a:tab pos="914400" algn="l"/>
+                <a:tab pos="1371600" algn="l"/>
+                <a:tab pos="1828800" algn="l"/>
+                <a:tab pos="2286000" algn="l"/>
+                <a:tab pos="2743200" algn="l"/>
+              </a:tabLst>
+              <a:defRPr sz="2400" b="1">
+                <a:solidFill>
+                  <a:schemeClr val="bg1"/>
+                </a:solidFill>
+                <a:latin typeface="Verdana" charset="0"/>
+                <a:ea typeface="Microsoft YaHei" charset="0"/>
+                <a:cs typeface="Microsoft YaHei" charset="0"/>
+              </a:defRPr>
+            </a:lvl3pPr>
+            <a:lvl4pPr eaLnBrk="0" hangingPunct="0">
+              <a:tabLst>
+                <a:tab pos="457200" algn="l"/>
+                <a:tab pos="914400" algn="l"/>
+                <a:tab pos="1371600" algn="l"/>
+                <a:tab pos="1828800" algn="l"/>
+                <a:tab pos="2286000" algn="l"/>
+                <a:tab pos="2743200" algn="l"/>
+              </a:tabLst>
+              <a:defRPr sz="2400" b="1">
+                <a:solidFill>
+                  <a:schemeClr val="bg1"/>
+                </a:solidFill>
+                <a:latin typeface="Verdana" charset="0"/>
+                <a:ea typeface="Microsoft YaHei" charset="0"/>
+                <a:cs typeface="Microsoft YaHei" charset="0"/>
+              </a:defRPr>
+            </a:lvl4pPr>
+            <a:lvl5pPr eaLnBrk="0" hangingPunct="0">
+              <a:tabLst>
+                <a:tab pos="457200" algn="l"/>
+                <a:tab pos="914400" algn="l"/>
+                <a:tab pos="1371600" algn="l"/>
+                <a:tab pos="1828800" algn="l"/>
+                <a:tab pos="2286000" algn="l"/>
+                <a:tab pos="2743200" algn="l"/>
+              </a:tabLst>
+              <a:defRPr sz="2400" b="1">
+                <a:solidFill>
+                  <a:schemeClr val="bg1"/>
+                </a:solidFill>
+                <a:latin typeface="Verdana" charset="0"/>
+                <a:ea typeface="Microsoft YaHei" charset="0"/>
+                <a:cs typeface="Microsoft YaHei" charset="0"/>
+              </a:defRPr>
+            </a:lvl5pPr>
+            <a:lvl6pPr marL="2514600" indent="-228600" eaLnBrk="0" fontAlgn="base" hangingPunct="0">
+              <a:spcBef>
+                <a:spcPct val="0"/>
+              </a:spcBef>
+              <a:spcAft>
+                <a:spcPct val="0"/>
+              </a:spcAft>
+              <a:buClr>
+                <a:srgbClr val="000000"/>
+              </a:buClr>
+              <a:buSzPct val="100000"/>
+              <a:buFont typeface="Times New Roman" charset="0"/>
+              <a:tabLst>
+                <a:tab pos="457200" algn="l"/>
+                <a:tab pos="914400" algn="l"/>
+                <a:tab pos="1371600" algn="l"/>
+                <a:tab pos="1828800" algn="l"/>
+                <a:tab pos="2286000" algn="l"/>
+                <a:tab pos="2743200" algn="l"/>
+              </a:tabLst>
+              <a:defRPr sz="2400" b="1">
+                <a:solidFill>
+                  <a:schemeClr val="bg1"/>
+                </a:solidFill>
+                <a:latin typeface="Verdana" charset="0"/>
+                <a:ea typeface="Microsoft YaHei" charset="0"/>
+                <a:cs typeface="Microsoft YaHei" charset="0"/>
+              </a:defRPr>
+            </a:lvl6pPr>
+            <a:lvl7pPr marL="2971800" indent="-228600" eaLnBrk="0" fontAlgn="base" hangingPunct="0">
+              <a:spcBef>
+                <a:spcPct val="0"/>
+              </a:spcBef>
+              <a:spcAft>
+                <a:spcPct val="0"/>
+              </a:spcAft>
+              <a:buClr>
+                <a:srgbClr val="000000"/>
+              </a:buClr>
+              <a:buSzPct val="100000"/>
+              <a:buFont typeface="Times New Roman" charset="0"/>
+              <a:tabLst>
+                <a:tab pos="457200" algn="l"/>
+                <a:tab pos="914400" algn="l"/>
+                <a:tab pos="1371600" algn="l"/>
+                <a:tab pos="1828800" algn="l"/>
+                <a:tab pos="2286000" algn="l"/>
+                <a:tab pos="2743200" algn="l"/>
+              </a:tabLst>
+              <a:defRPr sz="2400" b="1">
+                <a:solidFill>
+                  <a:schemeClr val="bg1"/>
+                </a:solidFill>
+                <a:latin typeface="Verdana" charset="0"/>
+                <a:ea typeface="Microsoft YaHei" charset="0"/>
+                <a:cs typeface="Microsoft YaHei" charset="0"/>
+              </a:defRPr>
+            </a:lvl7pPr>
+            <a:lvl8pPr marL="3429000" indent="-228600" eaLnBrk="0" fontAlgn="base" hangingPunct="0">
+              <a:spcBef>
+                <a:spcPct val="0"/>
+              </a:spcBef>
+              <a:spcAft>
+                <a:spcPct val="0"/>
+              </a:spcAft>
+              <a:buClr>
+                <a:srgbClr val="000000"/>
+              </a:buClr>
+              <a:buSzPct val="100000"/>
+              <a:buFont typeface="Times New Roman" charset="0"/>
+              <a:tabLst>
+                <a:tab pos="457200" algn="l"/>
+                <a:tab pos="914400" algn="l"/>
+                <a:tab pos="1371600" algn="l"/>
+                <a:tab pos="1828800" algn="l"/>
+                <a:tab pos="2286000" algn="l"/>
+                <a:tab pos="2743200" algn="l"/>
+              </a:tabLst>
+              <a:defRPr sz="2400" b="1">
+                <a:solidFill>
+                  <a:schemeClr val="bg1"/>
+                </a:solidFill>
+                <a:latin typeface="Verdana" charset="0"/>
+                <a:ea typeface="Microsoft YaHei" charset="0"/>
+                <a:cs typeface="Microsoft YaHei" charset="0"/>
+              </a:defRPr>
+            </a:lvl8pPr>
+            <a:lvl9pPr marL="3886200" indent="-228600" eaLnBrk="0" fontAlgn="base" hangingPunct="0">
+              <a:spcBef>
+                <a:spcPct val="0"/>
+              </a:spcBef>
+              <a:spcAft>
+                <a:spcPct val="0"/>
+              </a:spcAft>
+              <a:buClr>
+                <a:srgbClr val="000000"/>
+              </a:buClr>
+              <a:buSzPct val="100000"/>
+              <a:buFont typeface="Times New Roman" charset="0"/>
+              <a:tabLst>
+                <a:tab pos="457200" algn="l"/>
+                <a:tab pos="914400" algn="l"/>
+                <a:tab pos="1371600" algn="l"/>
+                <a:tab pos="1828800" algn="l"/>
+                <a:tab pos="2286000" algn="l"/>
+                <a:tab pos="2743200" algn="l"/>
+              </a:tabLst>
+              <a:defRPr sz="2400" b="1">
+                <a:solidFill>
+                  <a:schemeClr val="bg1"/>
+                </a:solidFill>
+                <a:latin typeface="Verdana" charset="0"/>
+                <a:ea typeface="Microsoft YaHei" charset="0"/>
+                <a:cs typeface="Microsoft YaHei" charset="0"/>
+              </a:defRPr>
+            </a:lvl9pPr>
+          </a:lstStyle>
+          <a:p>
+            <a:pPr eaLnBrk="1" hangingPunct="1"/>
+            <a:fld id="{AACA8C16-4EC5-8942-BBA2-0F7724B98F40}" type="slidenum">
+              <a:rPr lang="en-US" sz="1300">
+                <a:solidFill>
+                  <a:srgbClr val="000000"/>
+                </a:solidFill>
+                <a:latin typeface="Tahoma" charset="0"/>
+              </a:rPr>
+              <a:pPr eaLnBrk="1" hangingPunct="1"/>
+              <a:t>4</a:t>
+            </a:fld>
+            <a:endParaRPr lang="en-US" sz="1300">
+              <a:solidFill>
+                <a:srgbClr val="000000"/>
+              </a:solidFill>
+              <a:latin typeface="Tahoma" charset="0"/>
+            </a:endParaRPr>
+          </a:p>
+        </p:txBody>
+      </p:sp>
+      <p:sp>
+        <p:nvSpPr>
+          <p:cNvPr id="18435" name="Rectangle 1"/>
+          <p:cNvSpPr>
+            <a:spLocks noGrp="1" noRot="1" noChangeAspect="1" noChangeArrowheads="1" noTextEdit="1"/>
           </p:cNvSpPr>
           <p:nvPr>
             <p:ph type="sldImg"/>
@@ -6141,470 +6508,190 @@
           </a:p>
         </p:txBody>
       </p:sp>
-      <p:sp>
-        <p:nvSpPr>
-          <p:cNvPr id="15362" name="Text Box 2"/>
-          <p:cNvSpPr txBox="1">
-            <a:spLocks noChangeArrowheads="1"/>
-          </p:cNvSpPr>
+      <p:pic>
+        <p:nvPicPr>
+          <p:cNvPr id="2" name="Picture 1"/>
+          <p:cNvPicPr>
+            <a:picLocks noChangeAspect="1"/>
+          </p:cNvPicPr>
           <p:nvPr/>
-        </p:nvSpPr>
-        <p:spPr bwMode="auto">
+        </p:nvPicPr>
+        <p:blipFill>
+          <a:blip r:embed="rId3"/>
+          <a:stretch>
+            <a:fillRect/>
+          </a:stretch>
+        </p:blipFill>
+        <p:spPr>
           <a:xfrm>
-            <a:off x="990600" y="2514600"/>
-            <a:ext cx="6934200" cy="1828800"/>
+            <a:off x="2209800" y="2057400"/>
+            <a:ext cx="3924300" cy="3893721"/>
           </a:xfrm>
           <a:prstGeom prst="rect">
             <a:avLst/>
           </a:prstGeom>
-          <a:noFill/>
-          <a:ln>
-            <a:noFill/>
-          </a:ln>
-          <a:extLst>
-            <a:ext uri="{909E8E84-426E-40dd-AFC4-6F175D3DCCD1}">
-              <a14:hiddenFill xmlns:a14="http://schemas.microsoft.com/office/drawing/2010/main">
-                <a:solidFill>
-                  <a:srgbClr val="FFFFFF"/>
-                </a:solidFill>
-              </a14:hiddenFill>
-            </a:ext>
-            <a:ext uri="{91240B29-F687-4f45-9708-019B960494DF}">
-              <a14:hiddenLine xmlns:a14="http://schemas.microsoft.com/office/drawing/2010/main" w="9525">
-                <a:solidFill>
-                  <a:srgbClr val="000000"/>
-                </a:solidFill>
-                <a:round/>
-                <a:headEnd/>
-                <a:tailEnd/>
-              </a14:hiddenLine>
-            </a:ext>
-          </a:extLst>
+          <a:effectLst>
+            <a:outerShdw blurRad="50800" dist="38100" dir="2700000" algn="tl" rotWithShape="0">
+              <a:srgbClr val="000000">
+                <a:alpha val="43000"/>
+              </a:srgbClr>
+            </a:outerShdw>
+          </a:effectLst>
         </p:spPr>
+      </p:pic>
+      <p:sp>
+        <p:nvSpPr>
+          <p:cNvPr id="3" name="Rectangle 2"/>
+          <p:cNvSpPr/>
+          <p:nvPr/>
+        </p:nvSpPr>
+        <p:spPr>
+          <a:xfrm rot="20412317">
+            <a:off x="1160105" y="3385236"/>
+            <a:ext cx="5704582" cy="646331"/>
+          </a:xfrm>
+          <a:prstGeom prst="rect">
+            <a:avLst/>
+          </a:prstGeom>
+        </p:spPr>
+        <p:style>
+          <a:lnRef idx="1">
+            <a:schemeClr val="accent3"/>
+          </a:lnRef>
+          <a:fillRef idx="3">
+            <a:schemeClr val="accent3"/>
+          </a:fillRef>
+          <a:effectRef idx="2">
+            <a:schemeClr val="accent3"/>
+          </a:effectRef>
+          <a:fontRef idx="minor">
+            <a:schemeClr val="lt1"/>
+          </a:fontRef>
+        </p:style>
         <p:txBody>
-          <a:bodyPr/>
-          <a:lstStyle>
-            <a:lvl1pPr marL="338138" indent="-338138" eaLnBrk="0" hangingPunct="0">
-              <a:tabLst>
-                <a:tab pos="338138" algn="l"/>
-                <a:tab pos="795338" algn="l"/>
-                <a:tab pos="1252538" algn="l"/>
-                <a:tab pos="1709738" algn="l"/>
-                <a:tab pos="2166938" algn="l"/>
-                <a:tab pos="2624138" algn="l"/>
-                <a:tab pos="3081338" algn="l"/>
-                <a:tab pos="3538538" algn="l"/>
-                <a:tab pos="3995738" algn="l"/>
-                <a:tab pos="4452938" algn="l"/>
-                <a:tab pos="4910138" algn="l"/>
-                <a:tab pos="5367338" algn="l"/>
-                <a:tab pos="5824538" algn="l"/>
-                <a:tab pos="6281738" algn="l"/>
-                <a:tab pos="6738938" algn="l"/>
-                <a:tab pos="7196138" algn="l"/>
-                <a:tab pos="7653338" algn="l"/>
-                <a:tab pos="8110538" algn="l"/>
-                <a:tab pos="8567738" algn="l"/>
-                <a:tab pos="9024938" algn="l"/>
-                <a:tab pos="9482138" algn="l"/>
-              </a:tabLst>
-              <a:defRPr sz="2400" b="1">
-                <a:solidFill>
-                  <a:schemeClr val="bg1"/>
-                </a:solidFill>
-                <a:latin typeface="Verdana" charset="0"/>
-                <a:ea typeface="Microsoft YaHei" charset="0"/>
-                <a:cs typeface="Microsoft YaHei" charset="0"/>
-              </a:defRPr>
-            </a:lvl1pPr>
-            <a:lvl2pPr eaLnBrk="0" hangingPunct="0">
-              <a:tabLst>
-                <a:tab pos="338138" algn="l"/>
-                <a:tab pos="795338" algn="l"/>
-                <a:tab pos="1252538" algn="l"/>
-                <a:tab pos="1709738" algn="l"/>
-                <a:tab pos="2166938" algn="l"/>
-                <a:tab pos="2624138" algn="l"/>
-                <a:tab pos="3081338" algn="l"/>
-                <a:tab pos="3538538" algn="l"/>
-                <a:tab pos="3995738" algn="l"/>
-                <a:tab pos="4452938" algn="l"/>
-                <a:tab pos="4910138" algn="l"/>
-                <a:tab pos="5367338" algn="l"/>
-                <a:tab pos="5824538" algn="l"/>
-                <a:tab pos="6281738" algn="l"/>
-                <a:tab pos="6738938" algn="l"/>
-                <a:tab pos="7196138" algn="l"/>
-                <a:tab pos="7653338" algn="l"/>
-                <a:tab pos="8110538" algn="l"/>
-                <a:tab pos="8567738" algn="l"/>
-                <a:tab pos="9024938" algn="l"/>
-                <a:tab pos="9482138" algn="l"/>
-              </a:tabLst>
-              <a:defRPr sz="2400" b="1">
-                <a:solidFill>
-                  <a:schemeClr val="bg1"/>
-                </a:solidFill>
-                <a:latin typeface="Verdana" charset="0"/>
-                <a:ea typeface="Microsoft YaHei" charset="0"/>
-                <a:cs typeface="Microsoft YaHei" charset="0"/>
-              </a:defRPr>
-            </a:lvl2pPr>
-            <a:lvl3pPr eaLnBrk="0" hangingPunct="0">
-              <a:tabLst>
-                <a:tab pos="338138" algn="l"/>
-                <a:tab pos="795338" algn="l"/>
-                <a:tab pos="1252538" algn="l"/>
-                <a:tab pos="1709738" algn="l"/>
-                <a:tab pos="2166938" algn="l"/>
-                <a:tab pos="2624138" algn="l"/>
-                <a:tab pos="3081338" algn="l"/>
-                <a:tab pos="3538538" algn="l"/>
-                <a:tab pos="3995738" algn="l"/>
-                <a:tab pos="4452938" algn="l"/>
-                <a:tab pos="4910138" algn="l"/>
-                <a:tab pos="5367338" algn="l"/>
-                <a:tab pos="5824538" algn="l"/>
-                <a:tab pos="6281738" algn="l"/>
-                <a:tab pos="6738938" algn="l"/>
-                <a:tab pos="7196138" algn="l"/>
-                <a:tab pos="7653338" algn="l"/>
-                <a:tab pos="8110538" algn="l"/>
-                <a:tab pos="8567738" algn="l"/>
-                <a:tab pos="9024938" algn="l"/>
-                <a:tab pos="9482138" algn="l"/>
-              </a:tabLst>
-              <a:defRPr sz="2400" b="1">
-                <a:solidFill>
-                  <a:schemeClr val="bg1"/>
-                </a:solidFill>
-                <a:latin typeface="Verdana" charset="0"/>
-                <a:ea typeface="Microsoft YaHei" charset="0"/>
-                <a:cs typeface="Microsoft YaHei" charset="0"/>
-              </a:defRPr>
-            </a:lvl3pPr>
-            <a:lvl4pPr eaLnBrk="0" hangingPunct="0">
-              <a:tabLst>
-                <a:tab pos="338138" algn="l"/>
-                <a:tab pos="795338" algn="l"/>
-                <a:tab pos="1252538" algn="l"/>
-                <a:tab pos="1709738" algn="l"/>
-                <a:tab pos="2166938" algn="l"/>
-                <a:tab pos="2624138" algn="l"/>
-                <a:tab pos="3081338" algn="l"/>
-                <a:tab pos="3538538" algn="l"/>
-                <a:tab pos="3995738" algn="l"/>
-                <a:tab pos="4452938" algn="l"/>
-                <a:tab pos="4910138" algn="l"/>
-                <a:tab pos="5367338" algn="l"/>
-                <a:tab pos="5824538" algn="l"/>
-                <a:tab pos="6281738" algn="l"/>
-                <a:tab pos="6738938" algn="l"/>
-                <a:tab pos="7196138" algn="l"/>
-                <a:tab pos="7653338" algn="l"/>
-                <a:tab pos="8110538" algn="l"/>
-                <a:tab pos="8567738" algn="l"/>
-                <a:tab pos="9024938" algn="l"/>
-                <a:tab pos="9482138" algn="l"/>
-              </a:tabLst>
-              <a:defRPr sz="2400" b="1">
-                <a:solidFill>
-                  <a:schemeClr val="bg1"/>
-                </a:solidFill>
-                <a:latin typeface="Verdana" charset="0"/>
-                <a:ea typeface="Microsoft YaHei" charset="0"/>
-                <a:cs typeface="Microsoft YaHei" charset="0"/>
-              </a:defRPr>
-            </a:lvl4pPr>
-            <a:lvl5pPr eaLnBrk="0" hangingPunct="0">
-              <a:tabLst>
-                <a:tab pos="338138" algn="l"/>
-                <a:tab pos="795338" algn="l"/>
-                <a:tab pos="1252538" algn="l"/>
-                <a:tab pos="1709738" algn="l"/>
-                <a:tab pos="2166938" algn="l"/>
-                <a:tab pos="2624138" algn="l"/>
-                <a:tab pos="3081338" algn="l"/>
-                <a:tab pos="3538538" algn="l"/>
-                <a:tab pos="3995738" algn="l"/>
-                <a:tab pos="4452938" algn="l"/>
-                <a:tab pos="4910138" algn="l"/>
-                <a:tab pos="5367338" algn="l"/>
-                <a:tab pos="5824538" algn="l"/>
-                <a:tab pos="6281738" algn="l"/>
-                <a:tab pos="6738938" algn="l"/>
-                <a:tab pos="7196138" algn="l"/>
-                <a:tab pos="7653338" algn="l"/>
-                <a:tab pos="8110538" algn="l"/>
-                <a:tab pos="8567738" algn="l"/>
-                <a:tab pos="9024938" algn="l"/>
-                <a:tab pos="9482138" algn="l"/>
-              </a:tabLst>
-              <a:defRPr sz="2400" b="1">
-                <a:solidFill>
-                  <a:schemeClr val="bg1"/>
-                </a:solidFill>
-                <a:latin typeface="Verdana" charset="0"/>
-                <a:ea typeface="Microsoft YaHei" charset="0"/>
-                <a:cs typeface="Microsoft YaHei" charset="0"/>
-              </a:defRPr>
-            </a:lvl5pPr>
-            <a:lvl6pPr marL="2514600" indent="-228600" eaLnBrk="0" fontAlgn="base" hangingPunct="0">
-              <a:spcBef>
-                <a:spcPct val="0"/>
-              </a:spcBef>
-              <a:spcAft>
-                <a:spcPct val="0"/>
-              </a:spcAft>
-              <a:buClr>
-                <a:srgbClr val="000000"/>
-              </a:buClr>
-              <a:buSzPct val="100000"/>
-              <a:buFont typeface="Times New Roman" charset="0"/>
-              <a:tabLst>
-                <a:tab pos="338138" algn="l"/>
-                <a:tab pos="795338" algn="l"/>
-                <a:tab pos="1252538" algn="l"/>
-                <a:tab pos="1709738" algn="l"/>
-                <a:tab pos="2166938" algn="l"/>
-                <a:tab pos="2624138" algn="l"/>
-                <a:tab pos="3081338" algn="l"/>
-                <a:tab pos="3538538" algn="l"/>
-                <a:tab pos="3995738" algn="l"/>
-                <a:tab pos="4452938" algn="l"/>
-                <a:tab pos="4910138" algn="l"/>
-                <a:tab pos="5367338" algn="l"/>
-                <a:tab pos="5824538" algn="l"/>
-                <a:tab pos="6281738" algn="l"/>
-                <a:tab pos="6738938" algn="l"/>
-                <a:tab pos="7196138" algn="l"/>
-                <a:tab pos="7653338" algn="l"/>
-                <a:tab pos="8110538" algn="l"/>
-                <a:tab pos="8567738" algn="l"/>
-                <a:tab pos="9024938" algn="l"/>
-                <a:tab pos="9482138" algn="l"/>
-              </a:tabLst>
-              <a:defRPr sz="2400" b="1">
-                <a:solidFill>
-                  <a:schemeClr val="bg1"/>
-                </a:solidFill>
-                <a:latin typeface="Verdana" charset="0"/>
-                <a:ea typeface="Microsoft YaHei" charset="0"/>
-                <a:cs typeface="Microsoft YaHei" charset="0"/>
-              </a:defRPr>
-            </a:lvl6pPr>
-            <a:lvl7pPr marL="2971800" indent="-228600" eaLnBrk="0" fontAlgn="base" hangingPunct="0">
-              <a:spcBef>
-                <a:spcPct val="0"/>
-              </a:spcBef>
-              <a:spcAft>
-                <a:spcPct val="0"/>
-              </a:spcAft>
-              <a:buClr>
-                <a:srgbClr val="000000"/>
-              </a:buClr>
-              <a:buSzPct val="100000"/>
-              <a:buFont typeface="Times New Roman" charset="0"/>
-              <a:tabLst>
-                <a:tab pos="338138" algn="l"/>
-                <a:tab pos="795338" algn="l"/>
-                <a:tab pos="1252538" algn="l"/>
-                <a:tab pos="1709738" algn="l"/>
-                <a:tab pos="2166938" algn="l"/>
-                <a:tab pos="2624138" algn="l"/>
-                <a:tab pos="3081338" algn="l"/>
-                <a:tab pos="3538538" algn="l"/>
-                <a:tab pos="3995738" algn="l"/>
-                <a:tab pos="4452938" algn="l"/>
-                <a:tab pos="4910138" algn="l"/>
-                <a:tab pos="5367338" algn="l"/>
-                <a:tab pos="5824538" algn="l"/>
-                <a:tab pos="6281738" algn="l"/>
-                <a:tab pos="6738938" algn="l"/>
-                <a:tab pos="7196138" algn="l"/>
-                <a:tab pos="7653338" algn="l"/>
-                <a:tab pos="8110538" algn="l"/>
-                <a:tab pos="8567738" algn="l"/>
-                <a:tab pos="9024938" algn="l"/>
-                <a:tab pos="9482138" algn="l"/>
-              </a:tabLst>
-              <a:defRPr sz="2400" b="1">
-                <a:solidFill>
-                  <a:schemeClr val="bg1"/>
-                </a:solidFill>
-                <a:latin typeface="Verdana" charset="0"/>
-                <a:ea typeface="Microsoft YaHei" charset="0"/>
-                <a:cs typeface="Microsoft YaHei" charset="0"/>
-              </a:defRPr>
-            </a:lvl7pPr>
-            <a:lvl8pPr marL="3429000" indent="-228600" eaLnBrk="0" fontAlgn="base" hangingPunct="0">
-              <a:spcBef>
-                <a:spcPct val="0"/>
-              </a:spcBef>
-              <a:spcAft>
-                <a:spcPct val="0"/>
-              </a:spcAft>
-              <a:buClr>
-                <a:srgbClr val="000000"/>
-              </a:buClr>
-              <a:buSzPct val="100000"/>
-              <a:buFont typeface="Times New Roman" charset="0"/>
-              <a:tabLst>
-                <a:tab pos="338138" algn="l"/>
-                <a:tab pos="795338" algn="l"/>
-                <a:tab pos="1252538" algn="l"/>
-                <a:tab pos="1709738" algn="l"/>
-                <a:tab pos="2166938" algn="l"/>
-                <a:tab pos="2624138" algn="l"/>
-                <a:tab pos="3081338" algn="l"/>
-                <a:tab pos="3538538" algn="l"/>
-                <a:tab pos="3995738" algn="l"/>
-                <a:tab pos="4452938" algn="l"/>
-                <a:tab pos="4910138" algn="l"/>
-                <a:tab pos="5367338" algn="l"/>
-                <a:tab pos="5824538" algn="l"/>
-                <a:tab pos="6281738" algn="l"/>
-                <a:tab pos="6738938" algn="l"/>
-                <a:tab pos="7196138" algn="l"/>
-                <a:tab pos="7653338" algn="l"/>
-                <a:tab pos="8110538" algn="l"/>
-                <a:tab pos="8567738" algn="l"/>
-                <a:tab pos="9024938" algn="l"/>
-                <a:tab pos="9482138" algn="l"/>
-              </a:tabLst>
-              <a:defRPr sz="2400" b="1">
-                <a:solidFill>
-                  <a:schemeClr val="bg1"/>
-                </a:solidFill>
-                <a:latin typeface="Verdana" charset="0"/>
-                <a:ea typeface="Microsoft YaHei" charset="0"/>
-                <a:cs typeface="Microsoft YaHei" charset="0"/>
-              </a:defRPr>
-            </a:lvl8pPr>
-            <a:lvl9pPr marL="3886200" indent="-228600" eaLnBrk="0" fontAlgn="base" hangingPunct="0">
-              <a:spcBef>
-                <a:spcPct val="0"/>
-              </a:spcBef>
-              <a:spcAft>
-                <a:spcPct val="0"/>
-              </a:spcAft>
-              <a:buClr>
-                <a:srgbClr val="000000"/>
-              </a:buClr>
-              <a:buSzPct val="100000"/>
-              <a:buFont typeface="Times New Roman" charset="0"/>
-              <a:tabLst>
-                <a:tab pos="338138" algn="l"/>
-                <a:tab pos="795338" algn="l"/>
-                <a:tab pos="1252538" algn="l"/>
-                <a:tab pos="1709738" algn="l"/>
-                <a:tab pos="2166938" algn="l"/>
-                <a:tab pos="2624138" algn="l"/>
-                <a:tab pos="3081338" algn="l"/>
-                <a:tab pos="3538538" algn="l"/>
-                <a:tab pos="3995738" algn="l"/>
-                <a:tab pos="4452938" algn="l"/>
-                <a:tab pos="4910138" algn="l"/>
-                <a:tab pos="5367338" algn="l"/>
-                <a:tab pos="5824538" algn="l"/>
-                <a:tab pos="6281738" algn="l"/>
-                <a:tab pos="6738938" algn="l"/>
-                <a:tab pos="7196138" algn="l"/>
-                <a:tab pos="7653338" algn="l"/>
-                <a:tab pos="8110538" algn="l"/>
-                <a:tab pos="8567738" algn="l"/>
-                <a:tab pos="9024938" algn="l"/>
-                <a:tab pos="9482138" algn="l"/>
-              </a:tabLst>
-              <a:defRPr sz="2400" b="1">
-                <a:solidFill>
-                  <a:schemeClr val="bg1"/>
-                </a:solidFill>
-                <a:latin typeface="Verdana" charset="0"/>
-                <a:ea typeface="Microsoft YaHei" charset="0"/>
-                <a:cs typeface="Microsoft YaHei" charset="0"/>
-              </a:defRPr>
-            </a:lvl9pPr>
-          </a:lstStyle>
-          <a:p>
-            <a:pPr eaLnBrk="1" hangingPunct="1">
-              <a:spcBef>
-                <a:spcPts val="600"/>
-              </a:spcBef>
-              <a:buClr>
-                <a:srgbClr val="FF9900"/>
-              </a:buClr>
-              <a:buFont typeface="Wingdings" charset="0"/>
-              <a:buChar char=""/>
-            </a:pPr>
+          <a:bodyPr wrap="none" lIns="91440" tIns="45720" rIns="91440" bIns="45720">
+            <a:spAutoFit/>
+            <a:scene3d>
+              <a:camera prst="orthographicFront">
+                <a:rot lat="0" lon="0" rev="0"/>
+              </a:camera>
+              <a:lightRig rig="glow" dir="t">
+                <a:rot lat="0" lon="0" rev="3600000"/>
+              </a:lightRig>
+            </a:scene3d>
+            <a:sp3d prstMaterial="softEdge">
+              <a:bevelT w="29210" h="16510"/>
+              <a:contourClr>
+                <a:schemeClr val="accent4">
+                  <a:alpha val="95000"/>
+                </a:schemeClr>
+              </a:contourClr>
+            </a:sp3d>
+          </a:bodyPr>
+          <a:lstStyle/>
+          <a:p>
+            <a:pPr algn="ctr"/>
             <a:r>
-              <a:rPr lang="en-US" sz="2000" b="0">
-                <a:solidFill>
-                  <a:srgbClr val="000000"/>
-                </a:solidFill>
+              <a:rPr lang="en-US" sz="3600" dirty="0" smtClean="0">
+                <a:ln>
+                  <a:prstDash val="solid"/>
+                </a:ln>
+                <a:gradFill rotWithShape="1">
+                  <a:gsLst>
+                    <a:gs pos="0">
+                      <a:schemeClr val="accent4">
+                        <a:tint val="70000"/>
+                        <a:satMod val="200000"/>
+                      </a:schemeClr>
+                    </a:gs>
+                    <a:gs pos="40000">
+                      <a:schemeClr val="accent4">
+                        <a:tint val="90000"/>
+                        <a:satMod val="130000"/>
+                      </a:schemeClr>
+                    </a:gs>
+                    <a:gs pos="50000">
+                      <a:schemeClr val="accent4">
+                        <a:tint val="90000"/>
+                        <a:satMod val="130000"/>
+                      </a:schemeClr>
+                    </a:gs>
+                    <a:gs pos="68000">
+                      <a:schemeClr val="accent4">
+                        <a:tint val="90000"/>
+                        <a:satMod val="130000"/>
+                      </a:schemeClr>
+                    </a:gs>
+                    <a:gs pos="100000">
+                      <a:schemeClr val="accent4">
+                        <a:tint val="70000"/>
+                        <a:satMod val="200000"/>
+                      </a:schemeClr>
+                    </a:gs>
+                  </a:gsLst>
+                  <a:lin ang="5400000"/>
+                </a:gradFill>
+                <a:effectLst>
+                  <a:outerShdw blurRad="88000" dist="50800" dir="5040000" algn="tl">
+                    <a:schemeClr val="accent4">
+                      <a:tint val="80000"/>
+                      <a:satMod val="250000"/>
+                      <a:alpha val="45000"/>
+                    </a:schemeClr>
+                  </a:outerShdw>
+                </a:effectLst>
               </a:rPr>
-              <a:t>Products have too many pieces</a:t>
+              <a:t>Installation Checklist</a:t>
             </a:r>
-          </a:p>
-          <a:p>
-            <a:pPr eaLnBrk="1" hangingPunct="1">
-              <a:spcBef>
-                <a:spcPts val="600"/>
-              </a:spcBef>
-              <a:buClr>
-                <a:srgbClr val="FF9900"/>
-              </a:buClr>
-              <a:buFont typeface="Wingdings" charset="0"/>
-              <a:buChar char=""/>
-            </a:pPr>
-            <a:r>
-              <a:rPr lang="en-US" sz="2000" b="0">
-                <a:solidFill>
-                  <a:srgbClr val="000000"/>
-                </a:solidFill>
-              </a:rPr>
-              <a:t>Installations are confusing, tedious</a:t>
-            </a:r>
-          </a:p>
-          <a:p>
-            <a:pPr eaLnBrk="1" hangingPunct="1">
-              <a:spcBef>
-                <a:spcPts val="600"/>
-              </a:spcBef>
-              <a:buClr>
-                <a:srgbClr val="FF9900"/>
-              </a:buClr>
-              <a:buFont typeface="Wingdings" charset="0"/>
-              <a:buChar char=""/>
-            </a:pPr>
-            <a:r>
-              <a:rPr lang="en-US" sz="2000" b="0">
-                <a:solidFill>
-                  <a:srgbClr val="000000"/>
-                </a:solidFill>
-              </a:rPr>
-              <a:t>Need way to check what is installed</a:t>
-            </a:r>
-          </a:p>
-          <a:p>
-            <a:pPr eaLnBrk="1" hangingPunct="1">
-              <a:spcBef>
-                <a:spcPts val="600"/>
-              </a:spcBef>
-              <a:buClr>
-                <a:srgbClr val="FF9900"/>
-              </a:buClr>
-              <a:buFont typeface="Wingdings" charset="0"/>
-              <a:buChar char=""/>
-            </a:pPr>
-            <a:r>
-              <a:rPr lang="en-US" sz="2000" b="0">
-                <a:solidFill>
-                  <a:srgbClr val="000000"/>
-                </a:solidFill>
-              </a:rPr>
-              <a:t>No way to validate installation</a:t>
-            </a:r>
+            <a:endParaRPr lang="en-US" sz="3600" dirty="0">
+              <a:ln>
+                <a:prstDash val="solid"/>
+              </a:ln>
+              <a:gradFill rotWithShape="1">
+                <a:gsLst>
+                  <a:gs pos="0">
+                    <a:schemeClr val="accent4">
+                      <a:tint val="70000"/>
+                      <a:satMod val="200000"/>
+                    </a:schemeClr>
+                  </a:gs>
+                  <a:gs pos="40000">
+                    <a:schemeClr val="accent4">
+                      <a:tint val="90000"/>
+                      <a:satMod val="130000"/>
+                    </a:schemeClr>
+                  </a:gs>
+                  <a:gs pos="50000">
+                    <a:schemeClr val="accent4">
+                      <a:tint val="90000"/>
+                      <a:satMod val="130000"/>
+                    </a:schemeClr>
+                  </a:gs>
+                  <a:gs pos="68000">
+                    <a:schemeClr val="accent4">
+                      <a:tint val="90000"/>
+                      <a:satMod val="130000"/>
+                    </a:schemeClr>
+                  </a:gs>
+                  <a:gs pos="100000">
+                    <a:schemeClr val="accent4">
+                      <a:tint val="70000"/>
+                      <a:satMod val="200000"/>
+                    </a:schemeClr>
+                  </a:gs>
+                </a:gsLst>
+                <a:lin ang="5400000"/>
+              </a:gradFill>
+              <a:effectLst>
+                <a:outerShdw blurRad="88000" dist="50800" dir="5040000" algn="tl">
+                  <a:schemeClr val="accent4">
+                    <a:tint val="80000"/>
+                    <a:satMod val="250000"/>
+                    <a:alpha val="45000"/>
+                  </a:schemeClr>
+                </a:outerShdw>
+              </a:effectLst>
+            </a:endParaRPr>
           </a:p>
         </p:txBody>
       </p:sp>
@@ -7074,8 +7161,8 @@
         </p:nvSpPr>
         <p:spPr bwMode="auto">
           <a:xfrm>
-            <a:off x="914400" y="2514600"/>
-            <a:ext cx="6934200" cy="1828800"/>
+            <a:off x="1219200" y="2514600"/>
+            <a:ext cx="6934200" cy="2209800"/>
           </a:xfrm>
           <a:prstGeom prst="rect">
             <a:avLst/>
@@ -7461,13 +7548,18 @@
               <a:buChar char=""/>
             </a:pPr>
             <a:r>
-              <a:rPr lang="en-US" sz="2000" b="0">
+              <a:rPr lang="en-US" sz="2800" b="0" dirty="0" err="1">
                 <a:solidFill>
                   <a:srgbClr val="000000"/>
                 </a:solidFill>
               </a:rPr>
               <a:t>InstallShield</a:t>
             </a:r>
+            <a:endParaRPr lang="en-US" sz="2800" b="0" dirty="0">
+              <a:solidFill>
+                <a:srgbClr val="000000"/>
+              </a:solidFill>
+            </a:endParaRPr>
           </a:p>
           <a:p>
             <a:pPr eaLnBrk="1" hangingPunct="1">
@@ -7481,13 +7573,18 @@
               <a:buChar char=""/>
             </a:pPr>
             <a:r>
-              <a:rPr lang="en-US" sz="2000" b="0">
+              <a:rPr lang="en-US" sz="2800" b="0" dirty="0" err="1">
                 <a:solidFill>
                   <a:srgbClr val="000000"/>
                 </a:solidFill>
               </a:rPr>
               <a:t>InstallAnywhere</a:t>
             </a:r>
+            <a:endParaRPr lang="en-US" sz="2800" b="0" dirty="0">
+              <a:solidFill>
+                <a:srgbClr val="000000"/>
+              </a:solidFill>
+            </a:endParaRPr>
           </a:p>
           <a:p>
             <a:pPr eaLnBrk="1" hangingPunct="1">
@@ -7501,7 +7598,7 @@
               <a:buChar char=""/>
             </a:pPr>
             <a:r>
-              <a:rPr lang="en-US" sz="2000" b="0">
+              <a:rPr lang="en-US" sz="2800" b="0" dirty="0">
                 <a:solidFill>
                   <a:srgbClr val="000000"/>
                 </a:solidFill>
@@ -7521,7 +7618,7 @@
               <a:buChar char=""/>
             </a:pPr>
             <a:r>
-              <a:rPr lang="en-US" sz="2000" b="0">
+              <a:rPr lang="en-US" sz="2800" b="0" dirty="0">
                 <a:solidFill>
                   <a:srgbClr val="000000"/>
                 </a:solidFill>
@@ -7586,6 +7683,954 @@
       </p:grpSpPr>
       <p:sp>
         <p:nvSpPr>
+          <p:cNvPr id="17409" name="Text Box 1"/>
+          <p:cNvSpPr txBox="1">
+            <a:spLocks noChangeArrowheads="1"/>
+          </p:cNvSpPr>
+          <p:nvPr/>
+        </p:nvSpPr>
+        <p:spPr bwMode="auto">
+          <a:xfrm>
+            <a:off x="228600" y="0"/>
+            <a:ext cx="8229600" cy="1139825"/>
+          </a:xfrm>
+          <a:prstGeom prst="rect">
+            <a:avLst/>
+          </a:prstGeom>
+          <a:noFill/>
+          <a:ln>
+            <a:noFill/>
+          </a:ln>
+          <a:extLst>
+            <a:ext uri="{909E8E84-426E-40dd-AFC4-6F175D3DCCD1}">
+              <a14:hiddenFill xmlns:a14="http://schemas.microsoft.com/office/drawing/2010/main">
+                <a:solidFill>
+                  <a:srgbClr val="FFFFFF"/>
+                </a:solidFill>
+              </a14:hiddenFill>
+            </a:ext>
+            <a:ext uri="{91240B29-F687-4f45-9708-019B960494DF}">
+              <a14:hiddenLine xmlns:a14="http://schemas.microsoft.com/office/drawing/2010/main" w="9525">
+                <a:solidFill>
+                  <a:srgbClr val="000000"/>
+                </a:solidFill>
+                <a:round/>
+                <a:headEnd/>
+                <a:tailEnd/>
+              </a14:hiddenLine>
+            </a:ext>
+          </a:extLst>
+        </p:spPr>
+        <p:txBody>
+          <a:bodyPr anchor="b"/>
+          <a:lstStyle>
+            <a:lvl1pPr eaLnBrk="0" hangingPunct="0">
+              <a:tabLst>
+                <a:tab pos="0" algn="l"/>
+                <a:tab pos="457200" algn="l"/>
+                <a:tab pos="914400" algn="l"/>
+                <a:tab pos="1371600" algn="l"/>
+                <a:tab pos="1828800" algn="l"/>
+                <a:tab pos="2286000" algn="l"/>
+                <a:tab pos="2743200" algn="l"/>
+                <a:tab pos="3200400" algn="l"/>
+                <a:tab pos="3657600" algn="l"/>
+                <a:tab pos="4114800" algn="l"/>
+                <a:tab pos="4572000" algn="l"/>
+                <a:tab pos="5029200" algn="l"/>
+                <a:tab pos="5486400" algn="l"/>
+                <a:tab pos="5943600" algn="l"/>
+                <a:tab pos="6400800" algn="l"/>
+                <a:tab pos="6858000" algn="l"/>
+                <a:tab pos="7315200" algn="l"/>
+                <a:tab pos="7772400" algn="l"/>
+                <a:tab pos="8229600" algn="l"/>
+                <a:tab pos="8686800" algn="l"/>
+                <a:tab pos="9144000" algn="l"/>
+              </a:tabLst>
+              <a:defRPr sz="2400" b="1">
+                <a:solidFill>
+                  <a:schemeClr val="bg1"/>
+                </a:solidFill>
+                <a:latin typeface="Verdana" charset="0"/>
+                <a:ea typeface="Microsoft YaHei" charset="0"/>
+                <a:cs typeface="Microsoft YaHei" charset="0"/>
+              </a:defRPr>
+            </a:lvl1pPr>
+            <a:lvl2pPr eaLnBrk="0" hangingPunct="0">
+              <a:tabLst>
+                <a:tab pos="0" algn="l"/>
+                <a:tab pos="457200" algn="l"/>
+                <a:tab pos="914400" algn="l"/>
+                <a:tab pos="1371600" algn="l"/>
+                <a:tab pos="1828800" algn="l"/>
+                <a:tab pos="2286000" algn="l"/>
+                <a:tab pos="2743200" algn="l"/>
+                <a:tab pos="3200400" algn="l"/>
+                <a:tab pos="3657600" algn="l"/>
+                <a:tab pos="4114800" algn="l"/>
+                <a:tab pos="4572000" algn="l"/>
+                <a:tab pos="5029200" algn="l"/>
+                <a:tab pos="5486400" algn="l"/>
+                <a:tab pos="5943600" algn="l"/>
+                <a:tab pos="6400800" algn="l"/>
+                <a:tab pos="6858000" algn="l"/>
+                <a:tab pos="7315200" algn="l"/>
+                <a:tab pos="7772400" algn="l"/>
+                <a:tab pos="8229600" algn="l"/>
+                <a:tab pos="8686800" algn="l"/>
+                <a:tab pos="9144000" algn="l"/>
+              </a:tabLst>
+              <a:defRPr sz="2400" b="1">
+                <a:solidFill>
+                  <a:schemeClr val="bg1"/>
+                </a:solidFill>
+                <a:latin typeface="Verdana" charset="0"/>
+                <a:ea typeface="Microsoft YaHei" charset="0"/>
+                <a:cs typeface="Microsoft YaHei" charset="0"/>
+              </a:defRPr>
+            </a:lvl2pPr>
+            <a:lvl3pPr eaLnBrk="0" hangingPunct="0">
+              <a:tabLst>
+                <a:tab pos="0" algn="l"/>
+                <a:tab pos="457200" algn="l"/>
+                <a:tab pos="914400" algn="l"/>
+                <a:tab pos="1371600" algn="l"/>
+                <a:tab pos="1828800" algn="l"/>
+                <a:tab pos="2286000" algn="l"/>
+                <a:tab pos="2743200" algn="l"/>
+                <a:tab pos="3200400" algn="l"/>
+                <a:tab pos="3657600" algn="l"/>
+                <a:tab pos="4114800" algn="l"/>
+                <a:tab pos="4572000" algn="l"/>
+                <a:tab pos="5029200" algn="l"/>
+                <a:tab pos="5486400" algn="l"/>
+                <a:tab pos="5943600" algn="l"/>
+                <a:tab pos="6400800" algn="l"/>
+                <a:tab pos="6858000" algn="l"/>
+                <a:tab pos="7315200" algn="l"/>
+                <a:tab pos="7772400" algn="l"/>
+                <a:tab pos="8229600" algn="l"/>
+                <a:tab pos="8686800" algn="l"/>
+                <a:tab pos="9144000" algn="l"/>
+              </a:tabLst>
+              <a:defRPr sz="2400" b="1">
+                <a:solidFill>
+                  <a:schemeClr val="bg1"/>
+                </a:solidFill>
+                <a:latin typeface="Verdana" charset="0"/>
+                <a:ea typeface="Microsoft YaHei" charset="0"/>
+                <a:cs typeface="Microsoft YaHei" charset="0"/>
+              </a:defRPr>
+            </a:lvl3pPr>
+            <a:lvl4pPr eaLnBrk="0" hangingPunct="0">
+              <a:tabLst>
+                <a:tab pos="0" algn="l"/>
+                <a:tab pos="457200" algn="l"/>
+                <a:tab pos="914400" algn="l"/>
+                <a:tab pos="1371600" algn="l"/>
+                <a:tab pos="1828800" algn="l"/>
+                <a:tab pos="2286000" algn="l"/>
+                <a:tab pos="2743200" algn="l"/>
+                <a:tab pos="3200400" algn="l"/>
+                <a:tab pos="3657600" algn="l"/>
+                <a:tab pos="4114800" algn="l"/>
+                <a:tab pos="4572000" algn="l"/>
+                <a:tab pos="5029200" algn="l"/>
+                <a:tab pos="5486400" algn="l"/>
+                <a:tab pos="5943600" algn="l"/>
+                <a:tab pos="6400800" algn="l"/>
+                <a:tab pos="6858000" algn="l"/>
+                <a:tab pos="7315200" algn="l"/>
+                <a:tab pos="7772400" algn="l"/>
+                <a:tab pos="8229600" algn="l"/>
+                <a:tab pos="8686800" algn="l"/>
+                <a:tab pos="9144000" algn="l"/>
+              </a:tabLst>
+              <a:defRPr sz="2400" b="1">
+                <a:solidFill>
+                  <a:schemeClr val="bg1"/>
+                </a:solidFill>
+                <a:latin typeface="Verdana" charset="0"/>
+                <a:ea typeface="Microsoft YaHei" charset="0"/>
+                <a:cs typeface="Microsoft YaHei" charset="0"/>
+              </a:defRPr>
+            </a:lvl4pPr>
+            <a:lvl5pPr eaLnBrk="0" hangingPunct="0">
+              <a:tabLst>
+                <a:tab pos="0" algn="l"/>
+                <a:tab pos="457200" algn="l"/>
+                <a:tab pos="914400" algn="l"/>
+                <a:tab pos="1371600" algn="l"/>
+                <a:tab pos="1828800" algn="l"/>
+                <a:tab pos="2286000" algn="l"/>
+                <a:tab pos="2743200" algn="l"/>
+                <a:tab pos="3200400" algn="l"/>
+                <a:tab pos="3657600" algn="l"/>
+                <a:tab pos="4114800" algn="l"/>
+                <a:tab pos="4572000" algn="l"/>
+                <a:tab pos="5029200" algn="l"/>
+                <a:tab pos="5486400" algn="l"/>
+                <a:tab pos="5943600" algn="l"/>
+                <a:tab pos="6400800" algn="l"/>
+                <a:tab pos="6858000" algn="l"/>
+                <a:tab pos="7315200" algn="l"/>
+                <a:tab pos="7772400" algn="l"/>
+                <a:tab pos="8229600" algn="l"/>
+                <a:tab pos="8686800" algn="l"/>
+                <a:tab pos="9144000" algn="l"/>
+              </a:tabLst>
+              <a:defRPr sz="2400" b="1">
+                <a:solidFill>
+                  <a:schemeClr val="bg1"/>
+                </a:solidFill>
+                <a:latin typeface="Verdana" charset="0"/>
+                <a:ea typeface="Microsoft YaHei" charset="0"/>
+                <a:cs typeface="Microsoft YaHei" charset="0"/>
+              </a:defRPr>
+            </a:lvl5pPr>
+            <a:lvl6pPr marL="2514600" indent="-228600" eaLnBrk="0" fontAlgn="base" hangingPunct="0">
+              <a:spcBef>
+                <a:spcPct val="0"/>
+              </a:spcBef>
+              <a:spcAft>
+                <a:spcPct val="0"/>
+              </a:spcAft>
+              <a:buClr>
+                <a:srgbClr val="000000"/>
+              </a:buClr>
+              <a:buSzPct val="100000"/>
+              <a:buFont typeface="Times New Roman" charset="0"/>
+              <a:tabLst>
+                <a:tab pos="0" algn="l"/>
+                <a:tab pos="457200" algn="l"/>
+                <a:tab pos="914400" algn="l"/>
+                <a:tab pos="1371600" algn="l"/>
+                <a:tab pos="1828800" algn="l"/>
+                <a:tab pos="2286000" algn="l"/>
+                <a:tab pos="2743200" algn="l"/>
+                <a:tab pos="3200400" algn="l"/>
+                <a:tab pos="3657600" algn="l"/>
+                <a:tab pos="4114800" algn="l"/>
+                <a:tab pos="4572000" algn="l"/>
+                <a:tab pos="5029200" algn="l"/>
+                <a:tab pos="5486400" algn="l"/>
+                <a:tab pos="5943600" algn="l"/>
+                <a:tab pos="6400800" algn="l"/>
+                <a:tab pos="6858000" algn="l"/>
+                <a:tab pos="7315200" algn="l"/>
+                <a:tab pos="7772400" algn="l"/>
+                <a:tab pos="8229600" algn="l"/>
+                <a:tab pos="8686800" algn="l"/>
+                <a:tab pos="9144000" algn="l"/>
+              </a:tabLst>
+              <a:defRPr sz="2400" b="1">
+                <a:solidFill>
+                  <a:schemeClr val="bg1"/>
+                </a:solidFill>
+                <a:latin typeface="Verdana" charset="0"/>
+                <a:ea typeface="Microsoft YaHei" charset="0"/>
+                <a:cs typeface="Microsoft YaHei" charset="0"/>
+              </a:defRPr>
+            </a:lvl6pPr>
+            <a:lvl7pPr marL="2971800" indent="-228600" eaLnBrk="0" fontAlgn="base" hangingPunct="0">
+              <a:spcBef>
+                <a:spcPct val="0"/>
+              </a:spcBef>
+              <a:spcAft>
+                <a:spcPct val="0"/>
+              </a:spcAft>
+              <a:buClr>
+                <a:srgbClr val="000000"/>
+              </a:buClr>
+              <a:buSzPct val="100000"/>
+              <a:buFont typeface="Times New Roman" charset="0"/>
+              <a:tabLst>
+                <a:tab pos="0" algn="l"/>
+                <a:tab pos="457200" algn="l"/>
+                <a:tab pos="914400" algn="l"/>
+                <a:tab pos="1371600" algn="l"/>
+                <a:tab pos="1828800" algn="l"/>
+                <a:tab pos="2286000" algn="l"/>
+                <a:tab pos="2743200" algn="l"/>
+                <a:tab pos="3200400" algn="l"/>
+                <a:tab pos="3657600" algn="l"/>
+                <a:tab pos="4114800" algn="l"/>
+                <a:tab pos="4572000" algn="l"/>
+                <a:tab pos="5029200" algn="l"/>
+                <a:tab pos="5486400" algn="l"/>
+                <a:tab pos="5943600" algn="l"/>
+                <a:tab pos="6400800" algn="l"/>
+                <a:tab pos="6858000" algn="l"/>
+                <a:tab pos="7315200" algn="l"/>
+                <a:tab pos="7772400" algn="l"/>
+                <a:tab pos="8229600" algn="l"/>
+                <a:tab pos="8686800" algn="l"/>
+                <a:tab pos="9144000" algn="l"/>
+              </a:tabLst>
+              <a:defRPr sz="2400" b="1">
+                <a:solidFill>
+                  <a:schemeClr val="bg1"/>
+                </a:solidFill>
+                <a:latin typeface="Verdana" charset="0"/>
+                <a:ea typeface="Microsoft YaHei" charset="0"/>
+                <a:cs typeface="Microsoft YaHei" charset="0"/>
+              </a:defRPr>
+            </a:lvl7pPr>
+            <a:lvl8pPr marL="3429000" indent="-228600" eaLnBrk="0" fontAlgn="base" hangingPunct="0">
+              <a:spcBef>
+                <a:spcPct val="0"/>
+              </a:spcBef>
+              <a:spcAft>
+                <a:spcPct val="0"/>
+              </a:spcAft>
+              <a:buClr>
+                <a:srgbClr val="000000"/>
+              </a:buClr>
+              <a:buSzPct val="100000"/>
+              <a:buFont typeface="Times New Roman" charset="0"/>
+              <a:tabLst>
+                <a:tab pos="0" algn="l"/>
+                <a:tab pos="457200" algn="l"/>
+                <a:tab pos="914400" algn="l"/>
+                <a:tab pos="1371600" algn="l"/>
+                <a:tab pos="1828800" algn="l"/>
+                <a:tab pos="2286000" algn="l"/>
+                <a:tab pos="2743200" algn="l"/>
+                <a:tab pos="3200400" algn="l"/>
+                <a:tab pos="3657600" algn="l"/>
+                <a:tab pos="4114800" algn="l"/>
+                <a:tab pos="4572000" algn="l"/>
+                <a:tab pos="5029200" algn="l"/>
+                <a:tab pos="5486400" algn="l"/>
+                <a:tab pos="5943600" algn="l"/>
+                <a:tab pos="6400800" algn="l"/>
+                <a:tab pos="6858000" algn="l"/>
+                <a:tab pos="7315200" algn="l"/>
+                <a:tab pos="7772400" algn="l"/>
+                <a:tab pos="8229600" algn="l"/>
+                <a:tab pos="8686800" algn="l"/>
+                <a:tab pos="9144000" algn="l"/>
+              </a:tabLst>
+              <a:defRPr sz="2400" b="1">
+                <a:solidFill>
+                  <a:schemeClr val="bg1"/>
+                </a:solidFill>
+                <a:latin typeface="Verdana" charset="0"/>
+                <a:ea typeface="Microsoft YaHei" charset="0"/>
+                <a:cs typeface="Microsoft YaHei" charset="0"/>
+              </a:defRPr>
+            </a:lvl8pPr>
+            <a:lvl9pPr marL="3886200" indent="-228600" eaLnBrk="0" fontAlgn="base" hangingPunct="0">
+              <a:spcBef>
+                <a:spcPct val="0"/>
+              </a:spcBef>
+              <a:spcAft>
+                <a:spcPct val="0"/>
+              </a:spcAft>
+              <a:buClr>
+                <a:srgbClr val="000000"/>
+              </a:buClr>
+              <a:buSzPct val="100000"/>
+              <a:buFont typeface="Times New Roman" charset="0"/>
+              <a:tabLst>
+                <a:tab pos="0" algn="l"/>
+                <a:tab pos="457200" algn="l"/>
+                <a:tab pos="914400" algn="l"/>
+                <a:tab pos="1371600" algn="l"/>
+                <a:tab pos="1828800" algn="l"/>
+                <a:tab pos="2286000" algn="l"/>
+                <a:tab pos="2743200" algn="l"/>
+                <a:tab pos="3200400" algn="l"/>
+                <a:tab pos="3657600" algn="l"/>
+                <a:tab pos="4114800" algn="l"/>
+                <a:tab pos="4572000" algn="l"/>
+                <a:tab pos="5029200" algn="l"/>
+                <a:tab pos="5486400" algn="l"/>
+                <a:tab pos="5943600" algn="l"/>
+                <a:tab pos="6400800" algn="l"/>
+                <a:tab pos="6858000" algn="l"/>
+                <a:tab pos="7315200" algn="l"/>
+                <a:tab pos="7772400" algn="l"/>
+                <a:tab pos="8229600" algn="l"/>
+                <a:tab pos="8686800" algn="l"/>
+                <a:tab pos="9144000" algn="l"/>
+              </a:tabLst>
+              <a:defRPr sz="2400" b="1">
+                <a:solidFill>
+                  <a:schemeClr val="bg1"/>
+                </a:solidFill>
+                <a:latin typeface="Verdana" charset="0"/>
+                <a:ea typeface="Microsoft YaHei" charset="0"/>
+                <a:cs typeface="Microsoft YaHei" charset="0"/>
+              </a:defRPr>
+            </a:lvl9pPr>
+          </a:lstStyle>
+          <a:p>
+            <a:pPr eaLnBrk="1" hangingPunct="1">
+              <a:buClrTx/>
+              <a:buFontTx/>
+              <a:buNone/>
+            </a:pPr>
+            <a:r>
+              <a:rPr lang="en-US" sz="4400" b="0" dirty="0" smtClean="0">
+                <a:solidFill>
+                  <a:srgbClr val="800000"/>
+                </a:solidFill>
+                <a:latin typeface="Arial" charset="0"/>
+              </a:rPr>
+              <a:t>Design Goals</a:t>
+            </a:r>
+            <a:endParaRPr lang="en-US" sz="4400" b="0" dirty="0">
+              <a:solidFill>
+                <a:srgbClr val="800000"/>
+              </a:solidFill>
+              <a:latin typeface="Arial" charset="0"/>
+            </a:endParaRPr>
+          </a:p>
+        </p:txBody>
+      </p:sp>
+      <p:sp>
+        <p:nvSpPr>
+          <p:cNvPr id="17410" name="Text Box 2"/>
+          <p:cNvSpPr txBox="1">
+            <a:spLocks noChangeArrowheads="1"/>
+          </p:cNvSpPr>
+          <p:nvPr/>
+        </p:nvSpPr>
+        <p:spPr bwMode="auto">
+          <a:xfrm>
+            <a:off x="1295400" y="2895600"/>
+            <a:ext cx="6934200" cy="1828800"/>
+          </a:xfrm>
+          <a:prstGeom prst="rect">
+            <a:avLst/>
+          </a:prstGeom>
+          <a:noFill/>
+          <a:ln>
+            <a:noFill/>
+          </a:ln>
+          <a:extLst>
+            <a:ext uri="{909E8E84-426E-40dd-AFC4-6F175D3DCCD1}">
+              <a14:hiddenFill xmlns:a14="http://schemas.microsoft.com/office/drawing/2010/main">
+                <a:solidFill>
+                  <a:srgbClr val="FFFFFF"/>
+                </a:solidFill>
+              </a14:hiddenFill>
+            </a:ext>
+            <a:ext uri="{91240B29-F687-4f45-9708-019B960494DF}">
+              <a14:hiddenLine xmlns:a14="http://schemas.microsoft.com/office/drawing/2010/main" w="9525">
+                <a:solidFill>
+                  <a:srgbClr val="000000"/>
+                </a:solidFill>
+                <a:round/>
+                <a:headEnd/>
+                <a:tailEnd/>
+              </a14:hiddenLine>
+            </a:ext>
+          </a:extLst>
+        </p:spPr>
+        <p:txBody>
+          <a:bodyPr/>
+          <a:lstStyle>
+            <a:lvl1pPr marL="338138" indent="-338138" eaLnBrk="0" hangingPunct="0">
+              <a:tabLst>
+                <a:tab pos="338138" algn="l"/>
+                <a:tab pos="795338" algn="l"/>
+                <a:tab pos="1252538" algn="l"/>
+                <a:tab pos="1709738" algn="l"/>
+                <a:tab pos="2166938" algn="l"/>
+                <a:tab pos="2624138" algn="l"/>
+                <a:tab pos="3081338" algn="l"/>
+                <a:tab pos="3538538" algn="l"/>
+                <a:tab pos="3995738" algn="l"/>
+                <a:tab pos="4452938" algn="l"/>
+                <a:tab pos="4910138" algn="l"/>
+                <a:tab pos="5367338" algn="l"/>
+                <a:tab pos="5824538" algn="l"/>
+                <a:tab pos="6281738" algn="l"/>
+                <a:tab pos="6738938" algn="l"/>
+                <a:tab pos="7196138" algn="l"/>
+                <a:tab pos="7653338" algn="l"/>
+                <a:tab pos="8110538" algn="l"/>
+                <a:tab pos="8567738" algn="l"/>
+                <a:tab pos="9024938" algn="l"/>
+                <a:tab pos="9482138" algn="l"/>
+              </a:tabLst>
+              <a:defRPr sz="2400" b="1">
+                <a:solidFill>
+                  <a:schemeClr val="bg1"/>
+                </a:solidFill>
+                <a:latin typeface="Verdana" charset="0"/>
+                <a:ea typeface="Microsoft YaHei" charset="0"/>
+                <a:cs typeface="Microsoft YaHei" charset="0"/>
+              </a:defRPr>
+            </a:lvl1pPr>
+            <a:lvl2pPr eaLnBrk="0" hangingPunct="0">
+              <a:tabLst>
+                <a:tab pos="338138" algn="l"/>
+                <a:tab pos="795338" algn="l"/>
+                <a:tab pos="1252538" algn="l"/>
+                <a:tab pos="1709738" algn="l"/>
+                <a:tab pos="2166938" algn="l"/>
+                <a:tab pos="2624138" algn="l"/>
+                <a:tab pos="3081338" algn="l"/>
+                <a:tab pos="3538538" algn="l"/>
+                <a:tab pos="3995738" algn="l"/>
+                <a:tab pos="4452938" algn="l"/>
+                <a:tab pos="4910138" algn="l"/>
+                <a:tab pos="5367338" algn="l"/>
+                <a:tab pos="5824538" algn="l"/>
+                <a:tab pos="6281738" algn="l"/>
+                <a:tab pos="6738938" algn="l"/>
+                <a:tab pos="7196138" algn="l"/>
+                <a:tab pos="7653338" algn="l"/>
+                <a:tab pos="8110538" algn="l"/>
+                <a:tab pos="8567738" algn="l"/>
+                <a:tab pos="9024938" algn="l"/>
+                <a:tab pos="9482138" algn="l"/>
+              </a:tabLst>
+              <a:defRPr sz="2400" b="1">
+                <a:solidFill>
+                  <a:schemeClr val="bg1"/>
+                </a:solidFill>
+                <a:latin typeface="Verdana" charset="0"/>
+                <a:ea typeface="Microsoft YaHei" charset="0"/>
+                <a:cs typeface="Microsoft YaHei" charset="0"/>
+              </a:defRPr>
+            </a:lvl2pPr>
+            <a:lvl3pPr eaLnBrk="0" hangingPunct="0">
+              <a:tabLst>
+                <a:tab pos="338138" algn="l"/>
+                <a:tab pos="795338" algn="l"/>
+                <a:tab pos="1252538" algn="l"/>
+                <a:tab pos="1709738" algn="l"/>
+                <a:tab pos="2166938" algn="l"/>
+                <a:tab pos="2624138" algn="l"/>
+                <a:tab pos="3081338" algn="l"/>
+                <a:tab pos="3538538" algn="l"/>
+                <a:tab pos="3995738" algn="l"/>
+                <a:tab pos="4452938" algn="l"/>
+                <a:tab pos="4910138" algn="l"/>
+                <a:tab pos="5367338" algn="l"/>
+                <a:tab pos="5824538" algn="l"/>
+                <a:tab pos="6281738" algn="l"/>
+                <a:tab pos="6738938" algn="l"/>
+                <a:tab pos="7196138" algn="l"/>
+                <a:tab pos="7653338" algn="l"/>
+                <a:tab pos="8110538" algn="l"/>
+                <a:tab pos="8567738" algn="l"/>
+                <a:tab pos="9024938" algn="l"/>
+                <a:tab pos="9482138" algn="l"/>
+              </a:tabLst>
+              <a:defRPr sz="2400" b="1">
+                <a:solidFill>
+                  <a:schemeClr val="bg1"/>
+                </a:solidFill>
+                <a:latin typeface="Verdana" charset="0"/>
+                <a:ea typeface="Microsoft YaHei" charset="0"/>
+                <a:cs typeface="Microsoft YaHei" charset="0"/>
+              </a:defRPr>
+            </a:lvl3pPr>
+            <a:lvl4pPr eaLnBrk="0" hangingPunct="0">
+              <a:tabLst>
+                <a:tab pos="338138" algn="l"/>
+                <a:tab pos="795338" algn="l"/>
+                <a:tab pos="1252538" algn="l"/>
+                <a:tab pos="1709738" algn="l"/>
+                <a:tab pos="2166938" algn="l"/>
+                <a:tab pos="2624138" algn="l"/>
+                <a:tab pos="3081338" algn="l"/>
+                <a:tab pos="3538538" algn="l"/>
+                <a:tab pos="3995738" algn="l"/>
+                <a:tab pos="4452938" algn="l"/>
+                <a:tab pos="4910138" algn="l"/>
+                <a:tab pos="5367338" algn="l"/>
+                <a:tab pos="5824538" algn="l"/>
+                <a:tab pos="6281738" algn="l"/>
+                <a:tab pos="6738938" algn="l"/>
+                <a:tab pos="7196138" algn="l"/>
+                <a:tab pos="7653338" algn="l"/>
+                <a:tab pos="8110538" algn="l"/>
+                <a:tab pos="8567738" algn="l"/>
+                <a:tab pos="9024938" algn="l"/>
+                <a:tab pos="9482138" algn="l"/>
+              </a:tabLst>
+              <a:defRPr sz="2400" b="1">
+                <a:solidFill>
+                  <a:schemeClr val="bg1"/>
+                </a:solidFill>
+                <a:latin typeface="Verdana" charset="0"/>
+                <a:ea typeface="Microsoft YaHei" charset="0"/>
+                <a:cs typeface="Microsoft YaHei" charset="0"/>
+              </a:defRPr>
+            </a:lvl4pPr>
+            <a:lvl5pPr eaLnBrk="0" hangingPunct="0">
+              <a:tabLst>
+                <a:tab pos="338138" algn="l"/>
+                <a:tab pos="795338" algn="l"/>
+                <a:tab pos="1252538" algn="l"/>
+                <a:tab pos="1709738" algn="l"/>
+                <a:tab pos="2166938" algn="l"/>
+                <a:tab pos="2624138" algn="l"/>
+                <a:tab pos="3081338" algn="l"/>
+                <a:tab pos="3538538" algn="l"/>
+                <a:tab pos="3995738" algn="l"/>
+                <a:tab pos="4452938" algn="l"/>
+                <a:tab pos="4910138" algn="l"/>
+                <a:tab pos="5367338" algn="l"/>
+                <a:tab pos="5824538" algn="l"/>
+                <a:tab pos="6281738" algn="l"/>
+                <a:tab pos="6738938" algn="l"/>
+                <a:tab pos="7196138" algn="l"/>
+                <a:tab pos="7653338" algn="l"/>
+                <a:tab pos="8110538" algn="l"/>
+                <a:tab pos="8567738" algn="l"/>
+                <a:tab pos="9024938" algn="l"/>
+                <a:tab pos="9482138" algn="l"/>
+              </a:tabLst>
+              <a:defRPr sz="2400" b="1">
+                <a:solidFill>
+                  <a:schemeClr val="bg1"/>
+                </a:solidFill>
+                <a:latin typeface="Verdana" charset="0"/>
+                <a:ea typeface="Microsoft YaHei" charset="0"/>
+                <a:cs typeface="Microsoft YaHei" charset="0"/>
+              </a:defRPr>
+            </a:lvl5pPr>
+            <a:lvl6pPr marL="2514600" indent="-228600" eaLnBrk="0" fontAlgn="base" hangingPunct="0">
+              <a:spcBef>
+                <a:spcPct val="0"/>
+              </a:spcBef>
+              <a:spcAft>
+                <a:spcPct val="0"/>
+              </a:spcAft>
+              <a:buClr>
+                <a:srgbClr val="000000"/>
+              </a:buClr>
+              <a:buSzPct val="100000"/>
+              <a:buFont typeface="Times New Roman" charset="0"/>
+              <a:tabLst>
+                <a:tab pos="338138" algn="l"/>
+                <a:tab pos="795338" algn="l"/>
+                <a:tab pos="1252538" algn="l"/>
+                <a:tab pos="1709738" algn="l"/>
+                <a:tab pos="2166938" algn="l"/>
+                <a:tab pos="2624138" algn="l"/>
+                <a:tab pos="3081338" algn="l"/>
+                <a:tab pos="3538538" algn="l"/>
+                <a:tab pos="3995738" algn="l"/>
+                <a:tab pos="4452938" algn="l"/>
+                <a:tab pos="4910138" algn="l"/>
+                <a:tab pos="5367338" algn="l"/>
+                <a:tab pos="5824538" algn="l"/>
+                <a:tab pos="6281738" algn="l"/>
+                <a:tab pos="6738938" algn="l"/>
+                <a:tab pos="7196138" algn="l"/>
+                <a:tab pos="7653338" algn="l"/>
+                <a:tab pos="8110538" algn="l"/>
+                <a:tab pos="8567738" algn="l"/>
+                <a:tab pos="9024938" algn="l"/>
+                <a:tab pos="9482138" algn="l"/>
+              </a:tabLst>
+              <a:defRPr sz="2400" b="1">
+                <a:solidFill>
+                  <a:schemeClr val="bg1"/>
+                </a:solidFill>
+                <a:latin typeface="Verdana" charset="0"/>
+                <a:ea typeface="Microsoft YaHei" charset="0"/>
+                <a:cs typeface="Microsoft YaHei" charset="0"/>
+              </a:defRPr>
+            </a:lvl6pPr>
+            <a:lvl7pPr marL="2971800" indent="-228600" eaLnBrk="0" fontAlgn="base" hangingPunct="0">
+              <a:spcBef>
+                <a:spcPct val="0"/>
+              </a:spcBef>
+              <a:spcAft>
+                <a:spcPct val="0"/>
+              </a:spcAft>
+              <a:buClr>
+                <a:srgbClr val="000000"/>
+              </a:buClr>
+              <a:buSzPct val="100000"/>
+              <a:buFont typeface="Times New Roman" charset="0"/>
+              <a:tabLst>
+                <a:tab pos="338138" algn="l"/>
+                <a:tab pos="795338" algn="l"/>
+                <a:tab pos="1252538" algn="l"/>
+                <a:tab pos="1709738" algn="l"/>
+                <a:tab pos="2166938" algn="l"/>
+                <a:tab pos="2624138" algn="l"/>
+                <a:tab pos="3081338" algn="l"/>
+                <a:tab pos="3538538" algn="l"/>
+                <a:tab pos="3995738" algn="l"/>
+                <a:tab pos="4452938" algn="l"/>
+                <a:tab pos="4910138" algn="l"/>
+                <a:tab pos="5367338" algn="l"/>
+                <a:tab pos="5824538" algn="l"/>
+                <a:tab pos="6281738" algn="l"/>
+                <a:tab pos="6738938" algn="l"/>
+                <a:tab pos="7196138" algn="l"/>
+                <a:tab pos="7653338" algn="l"/>
+                <a:tab pos="8110538" algn="l"/>
+                <a:tab pos="8567738" algn="l"/>
+                <a:tab pos="9024938" algn="l"/>
+                <a:tab pos="9482138" algn="l"/>
+              </a:tabLst>
+              <a:defRPr sz="2400" b="1">
+                <a:solidFill>
+                  <a:schemeClr val="bg1"/>
+                </a:solidFill>
+                <a:latin typeface="Verdana" charset="0"/>
+                <a:ea typeface="Microsoft YaHei" charset="0"/>
+                <a:cs typeface="Microsoft YaHei" charset="0"/>
+              </a:defRPr>
+            </a:lvl7pPr>
+            <a:lvl8pPr marL="3429000" indent="-228600" eaLnBrk="0" fontAlgn="base" hangingPunct="0">
+              <a:spcBef>
+                <a:spcPct val="0"/>
+              </a:spcBef>
+              <a:spcAft>
+                <a:spcPct val="0"/>
+              </a:spcAft>
+              <a:buClr>
+                <a:srgbClr val="000000"/>
+              </a:buClr>
+              <a:buSzPct val="100000"/>
+              <a:buFont typeface="Times New Roman" charset="0"/>
+              <a:tabLst>
+                <a:tab pos="338138" algn="l"/>
+                <a:tab pos="795338" algn="l"/>
+                <a:tab pos="1252538" algn="l"/>
+                <a:tab pos="1709738" algn="l"/>
+                <a:tab pos="2166938" algn="l"/>
+                <a:tab pos="2624138" algn="l"/>
+                <a:tab pos="3081338" algn="l"/>
+                <a:tab pos="3538538" algn="l"/>
+                <a:tab pos="3995738" algn="l"/>
+                <a:tab pos="4452938" algn="l"/>
+                <a:tab pos="4910138" algn="l"/>
+                <a:tab pos="5367338" algn="l"/>
+                <a:tab pos="5824538" algn="l"/>
+                <a:tab pos="6281738" algn="l"/>
+                <a:tab pos="6738938" algn="l"/>
+                <a:tab pos="7196138" algn="l"/>
+                <a:tab pos="7653338" algn="l"/>
+                <a:tab pos="8110538" algn="l"/>
+                <a:tab pos="8567738" algn="l"/>
+                <a:tab pos="9024938" algn="l"/>
+                <a:tab pos="9482138" algn="l"/>
+              </a:tabLst>
+              <a:defRPr sz="2400" b="1">
+                <a:solidFill>
+                  <a:schemeClr val="bg1"/>
+                </a:solidFill>
+                <a:latin typeface="Verdana" charset="0"/>
+                <a:ea typeface="Microsoft YaHei" charset="0"/>
+                <a:cs typeface="Microsoft YaHei" charset="0"/>
+              </a:defRPr>
+            </a:lvl8pPr>
+            <a:lvl9pPr marL="3886200" indent="-228600" eaLnBrk="0" fontAlgn="base" hangingPunct="0">
+              <a:spcBef>
+                <a:spcPct val="0"/>
+              </a:spcBef>
+              <a:spcAft>
+                <a:spcPct val="0"/>
+              </a:spcAft>
+              <a:buClr>
+                <a:srgbClr val="000000"/>
+              </a:buClr>
+              <a:buSzPct val="100000"/>
+              <a:buFont typeface="Times New Roman" charset="0"/>
+              <a:tabLst>
+                <a:tab pos="338138" algn="l"/>
+                <a:tab pos="795338" algn="l"/>
+                <a:tab pos="1252538" algn="l"/>
+                <a:tab pos="1709738" algn="l"/>
+                <a:tab pos="2166938" algn="l"/>
+                <a:tab pos="2624138" algn="l"/>
+                <a:tab pos="3081338" algn="l"/>
+                <a:tab pos="3538538" algn="l"/>
+                <a:tab pos="3995738" algn="l"/>
+                <a:tab pos="4452938" algn="l"/>
+                <a:tab pos="4910138" algn="l"/>
+                <a:tab pos="5367338" algn="l"/>
+                <a:tab pos="5824538" algn="l"/>
+                <a:tab pos="6281738" algn="l"/>
+                <a:tab pos="6738938" algn="l"/>
+                <a:tab pos="7196138" algn="l"/>
+                <a:tab pos="7653338" algn="l"/>
+                <a:tab pos="8110538" algn="l"/>
+                <a:tab pos="8567738" algn="l"/>
+                <a:tab pos="9024938" algn="l"/>
+                <a:tab pos="9482138" algn="l"/>
+              </a:tabLst>
+              <a:defRPr sz="2400" b="1">
+                <a:solidFill>
+                  <a:schemeClr val="bg1"/>
+                </a:solidFill>
+                <a:latin typeface="Verdana" charset="0"/>
+                <a:ea typeface="Microsoft YaHei" charset="0"/>
+                <a:cs typeface="Microsoft YaHei" charset="0"/>
+              </a:defRPr>
+            </a:lvl9pPr>
+          </a:lstStyle>
+          <a:p>
+            <a:pPr eaLnBrk="1" hangingPunct="1">
+              <a:spcBef>
+                <a:spcPts val="600"/>
+              </a:spcBef>
+              <a:buClr>
+                <a:srgbClr val="FF9900"/>
+              </a:buClr>
+              <a:buFont typeface="Wingdings" charset="0"/>
+              <a:buChar char=""/>
+            </a:pPr>
+            <a:r>
+              <a:rPr lang="en-US" sz="2800" b="0" dirty="0" smtClean="0">
+                <a:solidFill>
+                  <a:srgbClr val="000000"/>
+                </a:solidFill>
+              </a:rPr>
+              <a:t>Completely </a:t>
+            </a:r>
+            <a:r>
+              <a:rPr lang="en-US" sz="2800" b="0" smtClean="0">
+                <a:solidFill>
+                  <a:srgbClr val="000000"/>
+                </a:solidFill>
+              </a:rPr>
+              <a:t>s</a:t>
+            </a:r>
+            <a:r>
+              <a:rPr lang="en-US" sz="2800" b="0" smtClean="0">
+                <a:solidFill>
+                  <a:srgbClr val="000000"/>
+                </a:solidFill>
+              </a:rPr>
+              <a:t>cripted experience</a:t>
+            </a:r>
+          </a:p>
+          <a:p>
+            <a:pPr eaLnBrk="1" hangingPunct="1">
+              <a:spcBef>
+                <a:spcPts val="600"/>
+              </a:spcBef>
+              <a:buClr>
+                <a:srgbClr val="FF9900"/>
+              </a:buClr>
+              <a:buFont typeface="Wingdings" charset="0"/>
+              <a:buChar char=""/>
+            </a:pPr>
+            <a:r>
+              <a:rPr lang="en-US" sz="2800" b="0" smtClean="0">
+                <a:solidFill>
+                  <a:srgbClr val="000000"/>
+                </a:solidFill>
+              </a:rPr>
+              <a:t>Package </a:t>
+            </a:r>
+            <a:r>
+              <a:rPr lang="en-US" sz="2800" b="0" dirty="0" smtClean="0">
+                <a:solidFill>
+                  <a:srgbClr val="000000"/>
+                </a:solidFill>
+              </a:rPr>
+              <a:t>in single file</a:t>
+            </a:r>
+            <a:endParaRPr lang="en-US" sz="2800" b="0" dirty="0">
+              <a:solidFill>
+                <a:srgbClr val="000000"/>
+              </a:solidFill>
+            </a:endParaRPr>
+          </a:p>
+          <a:p>
+            <a:pPr eaLnBrk="1" hangingPunct="1">
+              <a:spcBef>
+                <a:spcPts val="600"/>
+              </a:spcBef>
+              <a:buClr>
+                <a:srgbClr val="FF9900"/>
+              </a:buClr>
+              <a:buFont typeface="Wingdings" charset="0"/>
+              <a:buChar char=""/>
+            </a:pPr>
+            <a:r>
+              <a:rPr lang="en-US" sz="2800" b="0" dirty="0" smtClean="0">
+                <a:solidFill>
+                  <a:srgbClr val="000000"/>
+                </a:solidFill>
+              </a:rPr>
+              <a:t>No outside dependencies</a:t>
+            </a:r>
+            <a:endParaRPr lang="en-US" sz="2800" b="0" dirty="0">
+              <a:solidFill>
+                <a:srgbClr val="000000"/>
+              </a:solidFill>
+            </a:endParaRPr>
+          </a:p>
+        </p:txBody>
+      </p:sp>
+    </p:spTree>
+    <p:extLst>
+      <p:ext uri="{BB962C8B-B14F-4D97-AF65-F5344CB8AC3E}">
+        <p14:creationId xmlns:p14="http://schemas.microsoft.com/office/powerpoint/2010/main" val="1685553225"/>
+      </p:ext>
+    </p:extLst>
+  </p:cSld>
+  <p:clrMapOvr>
+    <a:masterClrMapping/>
+  </p:clrMapOvr>
+  <p:transition xmlns:p14="http://schemas.microsoft.com/office/powerpoint/2010/main" spd="med"/>
+  <p:timing>
+    <p:tnLst>
+      <p:par>
+        <p:cTn xmlns:p14="http://schemas.microsoft.com/office/powerpoint/2010/main" id="1" dur="indefinite" restart="never" nodeType="tmRoot">
+          <p:childTnLst>
+            <p:seq concurrent="1" nextAc="seek">
+              <p:cTn id="2" dur="indefinite" nodeType="mainSeq"/>
+              <p:prevCondLst>
+                <p:cond evt="onPrev" delay="0">
+                  <p:tgtEl>
+                    <p:sldTgt/>
+                  </p:tgtEl>
+                </p:cond>
+              </p:prevCondLst>
+              <p:nextCondLst>
+                <p:cond evt="onNext" delay="0">
+                  <p:tgtEl>
+                    <p:sldTgt/>
+                  </p:tgtEl>
+                </p:cond>
+              </p:nextCondLst>
+            </p:seq>
+          </p:childTnLst>
+        </p:cTn>
+      </p:par>
+    </p:tnLst>
+  </p:timing>
+</p:sld>
+</file>
+
+<file path=ppt/slides/slide5.xml><?xml version="1.0" encoding="utf-8"?>
+<p:sld xmlns:a="http://schemas.openxmlformats.org/drawingml/2006/main" xmlns:r="http://schemas.openxmlformats.org/officeDocument/2006/relationships" xmlns:p="http://schemas.openxmlformats.org/presentationml/2006/main">
+  <p:cSld>
+    <p:spTree>
+      <p:nvGrpSpPr>
+        <p:cNvPr id="1" name=""/>
+        <p:cNvGrpSpPr/>
+        <p:nvPr/>
+      </p:nvGrpSpPr>
+      <p:grpSpPr>
+        <a:xfrm>
+          <a:off x="0" y="0"/>
+          <a:ext cx="0" cy="0"/>
+          <a:chOff x="0" y="0"/>
+          <a:chExt cx="0" cy="0"/>
+        </a:xfrm>
+      </p:grpSpPr>
+      <p:sp>
+        <p:nvSpPr>
           <p:cNvPr id="19457" name="Title 1"/>
           <p:cNvSpPr>
             <a:spLocks noGrp="1"/>
@@ -7611,13 +8656,9 @@
       </p:sp>
       <p:pic>
         <p:nvPicPr>
-          <p:cNvPr id="19458" name="Content Placeholder 5" descr="Macintosh HD:Users:chuckc:Development:diagrams:InstallerFlow.png"/>
-          <p:cNvPicPr>
-            <a:picLocks noGrp="1"/>
-          </p:cNvPicPr>
-          <p:nvPr>
-            <p:ph idx="1"/>
-          </p:nvPr>
+          <p:cNvPr id="5" name="Picture 4"/>
+          <p:cNvPicPr/>
+          <p:nvPr/>
         </p:nvPicPr>
         <p:blipFill>
           <a:blip r:embed="rId2">
@@ -7627,16 +8668,23 @@
               </a:ext>
             </a:extLst>
           </a:blip>
-          <a:srcRect t="3773" b="3773"/>
+          <a:srcRect/>
           <a:stretch>
             <a:fillRect/>
           </a:stretch>
         </p:blipFill>
-        <p:spPr>
+        <p:spPr bwMode="auto">
           <a:xfrm>
-            <a:off x="457200" y="1722438"/>
-            <a:ext cx="8224838" cy="4525962"/>
+            <a:off x="1600200" y="2369820"/>
+            <a:ext cx="5943600" cy="3040380"/>
           </a:xfrm>
+          <a:prstGeom prst="rect">
+            <a:avLst/>
+          </a:prstGeom>
+          <a:noFill/>
+          <a:ln>
+            <a:noFill/>
+          </a:ln>
         </p:spPr>
       </p:pic>
     </p:spTree>

</xml_diff>

<commit_message>
Extract resource from project file.
</commit_message>
<xml_diff>
--- a/MasterBuilder.pptx
+++ b/MasterBuilder.pptx
@@ -5,7 +5,7 @@
     <p:sldMasterId id="2147483649" r:id="rId1"/>
   </p:sldMasterIdLst>
   <p:notesMasterIdLst>
-    <p:notesMasterId r:id="rId7"/>
+    <p:notesMasterId r:id="rId8"/>
   </p:notesMasterIdLst>
   <p:sldIdLst>
     <p:sldId id="301" r:id="rId2"/>
@@ -13,6 +13,7 @@
     <p:sldId id="327" r:id="rId4"/>
     <p:sldId id="328" r:id="rId5"/>
     <p:sldId id="326" r:id="rId6"/>
+    <p:sldId id="329" r:id="rId7"/>
   </p:sldIdLst>
   <p:sldSz cx="9144000" cy="6858000" type="screen4x3"/>
   <p:notesSz cx="7315200" cy="9601200"/>
@@ -7618,13 +7619,18 @@
               <a:buChar char=""/>
             </a:pPr>
             <a:r>
-              <a:rPr lang="en-US" sz="2800" b="0" dirty="0">
+              <a:rPr lang="en-US" sz="2800" b="0" dirty="0" smtClean="0">
                 <a:solidFill>
                   <a:srgbClr val="000000"/>
                 </a:solidFill>
               </a:rPr>
-              <a:t>DIY</a:t>
+              <a:t>POI</a:t>
             </a:r>
+            <a:endParaRPr lang="en-US" sz="2800" b="0" dirty="0">
+              <a:solidFill>
+                <a:srgbClr val="000000"/>
+              </a:solidFill>
+            </a:endParaRPr>
           </a:p>
         </p:txBody>
       </p:sp>
@@ -8500,15 +8506,7 @@
                   <a:srgbClr val="000000"/>
                 </a:solidFill>
               </a:rPr>
-              <a:t>s</a:t>
-            </a:r>
-            <a:r>
-              <a:rPr lang="en-US" sz="2800" b="0" smtClean="0">
-                <a:solidFill>
-                  <a:srgbClr val="000000"/>
-                </a:solidFill>
-              </a:rPr>
-              <a:t>cripted experience</a:t>
+              <a:t>scripted experience</a:t>
             </a:r>
           </a:p>
           <a:p>
@@ -8656,7 +8654,99 @@
       </p:sp>
       <p:pic>
         <p:nvPicPr>
-          <p:cNvPr id="5" name="Picture 4"/>
+          <p:cNvPr id="11" name="Picture 10" descr="InstallerFlow.png"/>
+          <p:cNvPicPr>
+            <a:picLocks noChangeAspect="1"/>
+          </p:cNvPicPr>
+          <p:nvPr/>
+        </p:nvPicPr>
+        <p:blipFill>
+          <a:blip r:embed="rId2">
+            <a:extLst>
+              <a:ext uri="{28A0092B-C50C-407E-A947-70E740481C1C}">
+                <a14:useLocalDpi xmlns:a14="http://schemas.microsoft.com/office/drawing/2010/main" val="0"/>
+              </a:ext>
+            </a:extLst>
+          </a:blip>
+          <a:stretch>
+            <a:fillRect/>
+          </a:stretch>
+        </p:blipFill>
+        <p:spPr>
+          <a:xfrm>
+            <a:off x="838200" y="1981200"/>
+            <a:ext cx="7645400" cy="3911600"/>
+          </a:xfrm>
+          <a:prstGeom prst="rect">
+            <a:avLst/>
+          </a:prstGeom>
+        </p:spPr>
+      </p:pic>
+    </p:spTree>
+  </p:cSld>
+  <p:clrMapOvr>
+    <a:masterClrMapping/>
+  </p:clrMapOvr>
+  <p:transition xmlns:p14="http://schemas.microsoft.com/office/powerpoint/2010/main"/>
+  <p:timing>
+    <p:tnLst>
+      <p:par>
+        <p:cTn xmlns:p14="http://schemas.microsoft.com/office/powerpoint/2010/main" id="1" dur="indefinite" restart="never" nodeType="tmRoot"/>
+      </p:par>
+    </p:tnLst>
+  </p:timing>
+</p:sld>
+</file>
+
+<file path=ppt/slides/slide6.xml><?xml version="1.0" encoding="utf-8"?>
+<p:sld xmlns:a="http://schemas.openxmlformats.org/drawingml/2006/main" xmlns:r="http://schemas.openxmlformats.org/officeDocument/2006/relationships" xmlns:p="http://schemas.openxmlformats.org/presentationml/2006/main">
+  <p:cSld>
+    <p:spTree>
+      <p:nvGrpSpPr>
+        <p:cNvPr id="1" name=""/>
+        <p:cNvGrpSpPr/>
+        <p:nvPr/>
+      </p:nvGrpSpPr>
+      <p:grpSpPr>
+        <a:xfrm>
+          <a:off x="0" y="0"/>
+          <a:ext cx="0" cy="0"/>
+          <a:chOff x="0" y="0"/>
+          <a:chExt cx="0" cy="0"/>
+        </a:xfrm>
+      </p:grpSpPr>
+      <p:sp>
+        <p:nvSpPr>
+          <p:cNvPr id="19457" name="Title 1"/>
+          <p:cNvSpPr>
+            <a:spLocks noGrp="1"/>
+          </p:cNvSpPr>
+          <p:nvPr>
+            <p:ph type="title"/>
+          </p:nvPr>
+        </p:nvSpPr>
+        <p:spPr/>
+        <p:txBody>
+          <a:bodyPr/>
+          <a:lstStyle/>
+          <a:p>
+            <a:r>
+              <a:rPr lang="en-US" dirty="0" smtClean="0">
+                <a:latin typeface="Arial" charset="0"/>
+                <a:ea typeface="Microsoft YaHei" charset="0"/>
+              </a:rPr>
+              <a:t>Configuration Sharing</a:t>
+            </a:r>
+            <a:endParaRPr lang="en-US" dirty="0">
+              <a:latin typeface="Arial" charset="0"/>
+              <a:ea typeface="Microsoft YaHei" charset="0"/>
+            </a:endParaRPr>
+          </a:p>
+        </p:txBody>
+      </p:sp>
+      <p:pic>
+        <p:nvPicPr>
+          <p:cNvPr id="7" name="Picture 6"/>
           <p:cNvPicPr/>
           <p:nvPr/>
         </p:nvPicPr>
@@ -8675,8 +8765,8 @@
         </p:blipFill>
         <p:spPr bwMode="auto">
           <a:xfrm>
-            <a:off x="1600200" y="2369820"/>
-            <a:ext cx="5943600" cy="3040380"/>
+            <a:off x="1600200" y="2361565"/>
+            <a:ext cx="5943600" cy="2134870"/>
           </a:xfrm>
           <a:prstGeom prst="rect">
             <a:avLst/>
@@ -8688,6 +8778,11 @@
         </p:spPr>
       </p:pic>
     </p:spTree>
+    <p:extLst>
+      <p:ext uri="{BB962C8B-B14F-4D97-AF65-F5344CB8AC3E}">
+        <p14:creationId xmlns:p14="http://schemas.microsoft.com/office/powerpoint/2010/main" val="2024335987"/>
+      </p:ext>
+    </p:extLst>
   </p:cSld>
   <p:clrMapOvr>
     <a:masterClrMapping/>

</xml_diff>

<commit_message>
Includes Travis first prototype
</commit_message>
<xml_diff>
--- a/MasterBuilder.pptx
+++ b/MasterBuilder.pptx
@@ -5,7 +5,7 @@
     <p:sldMasterId id="2147483649" r:id="rId1"/>
   </p:sldMasterIdLst>
   <p:notesMasterIdLst>
-    <p:notesMasterId r:id="rId8"/>
+    <p:notesMasterId r:id="rId9"/>
   </p:notesMasterIdLst>
   <p:sldIdLst>
     <p:sldId id="301" r:id="rId2"/>
@@ -13,7 +13,8 @@
     <p:sldId id="328" r:id="rId4"/>
     <p:sldId id="327" r:id="rId5"/>
     <p:sldId id="326" r:id="rId6"/>
-    <p:sldId id="329" r:id="rId7"/>
+    <p:sldId id="330" r:id="rId7"/>
+    <p:sldId id="329" r:id="rId8"/>
   </p:sldIdLst>
   <p:sldSz cx="9144000" cy="6858000" type="screen4x3"/>
   <p:notesSz cx="7315200" cy="9601200"/>
@@ -1794,6 +1795,372 @@
               </a:rPr>
               <a:pPr eaLnBrk="1" hangingPunct="1"/>
               <a:t>4</a:t>
+            </a:fld>
+            <a:endParaRPr lang="en-US" sz="1300">
+              <a:solidFill>
+                <a:srgbClr val="000000"/>
+              </a:solidFill>
+              <a:latin typeface="Tahoma" charset="0"/>
+            </a:endParaRPr>
+          </a:p>
+        </p:txBody>
+      </p:sp>
+      <p:sp>
+        <p:nvSpPr>
+          <p:cNvPr id="18435" name="Rectangle 1"/>
+          <p:cNvSpPr>
+            <a:spLocks noGrp="1" noRot="1" noChangeAspect="1" noChangeArrowheads="1" noTextEdit="1"/>
+          </p:cNvSpPr>
+          <p:nvPr>
+            <p:ph type="sldImg"/>
+          </p:nvPr>
+        </p:nvSpPr>
+        <p:spPr>
+          <a:xfrm>
+            <a:off x="1257300" y="720725"/>
+            <a:ext cx="4800600" cy="3600450"/>
+          </a:xfrm>
+          <a:solidFill>
+            <a:srgbClr val="FFFFFF"/>
+          </a:solidFill>
+          <a:ln/>
+        </p:spPr>
+      </p:sp>
+      <p:sp>
+        <p:nvSpPr>
+          <p:cNvPr id="18436" name="Text Box 2"/>
+          <p:cNvSpPr txBox="1">
+            <a:spLocks noChangeArrowheads="1"/>
+          </p:cNvSpPr>
+          <p:nvPr/>
+        </p:nvSpPr>
+        <p:spPr bwMode="auto">
+          <a:xfrm>
+            <a:off x="974725" y="4560888"/>
+            <a:ext cx="5365750" cy="4319587"/>
+          </a:xfrm>
+          <a:prstGeom prst="rect">
+            <a:avLst/>
+          </a:prstGeom>
+          <a:noFill/>
+          <a:ln>
+            <a:noFill/>
+          </a:ln>
+          <a:extLst>
+            <a:ext uri="{909E8E84-426E-40dd-AFC4-6F175D3DCCD1}">
+              <a14:hiddenFill xmlns:a14="http://schemas.microsoft.com/office/drawing/2010/main">
+                <a:solidFill>
+                  <a:srgbClr val="FFFFFF"/>
+                </a:solidFill>
+              </a14:hiddenFill>
+            </a:ext>
+            <a:ext uri="{91240B29-F687-4f45-9708-019B960494DF}">
+              <a14:hiddenLine xmlns:a14="http://schemas.microsoft.com/office/drawing/2010/main" w="9525">
+                <a:solidFill>
+                  <a:srgbClr val="000000"/>
+                </a:solidFill>
+                <a:round/>
+                <a:headEnd/>
+                <a:tailEnd/>
+              </a14:hiddenLine>
+            </a:ext>
+          </a:extLst>
+        </p:spPr>
+        <p:txBody>
+          <a:bodyPr wrap="none" anchor="ctr"/>
+          <a:lstStyle/>
+          <a:p>
+            <a:endParaRPr lang="en-US"/>
+          </a:p>
+        </p:txBody>
+      </p:sp>
+    </p:spTree>
+  </p:cSld>
+  <p:clrMapOvr>
+    <a:masterClrMapping/>
+  </p:clrMapOvr>
+</p:notes>
+</file>
+
+<file path=ppt/notesSlides/notesSlide4.xml><?xml version="1.0" encoding="utf-8"?>
+<p:notes xmlns:a="http://schemas.openxmlformats.org/drawingml/2006/main" xmlns:r="http://schemas.openxmlformats.org/officeDocument/2006/relationships" xmlns:p="http://schemas.openxmlformats.org/presentationml/2006/main">
+  <p:cSld>
+    <p:bg>
+      <p:bgPr>
+        <a:solidFill>
+          <a:srgbClr val="FFFFFF"/>
+        </a:solidFill>
+        <a:effectLst/>
+      </p:bgPr>
+    </p:bg>
+    <p:spTree>
+      <p:nvGrpSpPr>
+        <p:cNvPr id="1" name=""/>
+        <p:cNvGrpSpPr/>
+        <p:nvPr/>
+      </p:nvGrpSpPr>
+      <p:grpSpPr>
+        <a:xfrm>
+          <a:off x="0" y="0"/>
+          <a:ext cx="0" cy="0"/>
+          <a:chOff x="0" y="0"/>
+          <a:chExt cx="0" cy="0"/>
+        </a:xfrm>
+      </p:grpSpPr>
+      <p:sp>
+        <p:nvSpPr>
+          <p:cNvPr id="18434" name="Rectangle 9"/>
+          <p:cNvSpPr>
+            <a:spLocks noGrp="1" noChangeArrowheads="1"/>
+          </p:cNvSpPr>
+          <p:nvPr>
+            <p:ph type="sldNum" sz="quarter"/>
+          </p:nvPr>
+        </p:nvSpPr>
+        <p:spPr>
+          <a:noFill/>
+          <a:ln/>
+          <a:extLst>
+            <a:ext uri="{909E8E84-426E-40dd-AFC4-6F175D3DCCD1}">
+              <a14:hiddenFill xmlns:a14="http://schemas.microsoft.com/office/drawing/2010/main">
+                <a:solidFill>
+                  <a:srgbClr val="FFFFFF"/>
+                </a:solidFill>
+              </a14:hiddenFill>
+            </a:ext>
+            <a:ext uri="{91240B29-F687-4f45-9708-019B960494DF}">
+              <a14:hiddenLine xmlns:a14="http://schemas.microsoft.com/office/drawing/2010/main" w="9525">
+                <a:solidFill>
+                  <a:srgbClr val="000000"/>
+                </a:solidFill>
+                <a:round/>
+                <a:headEnd/>
+                <a:tailEnd/>
+              </a14:hiddenLine>
+            </a:ext>
+          </a:extLst>
+        </p:spPr>
+        <p:txBody>
+          <a:bodyPr/>
+          <a:lstStyle>
+            <a:lvl1pPr eaLnBrk="0" hangingPunct="0">
+              <a:tabLst>
+                <a:tab pos="457200" algn="l"/>
+                <a:tab pos="914400" algn="l"/>
+                <a:tab pos="1371600" algn="l"/>
+                <a:tab pos="1828800" algn="l"/>
+                <a:tab pos="2286000" algn="l"/>
+                <a:tab pos="2743200" algn="l"/>
+              </a:tabLst>
+              <a:defRPr sz="2400" b="1">
+                <a:solidFill>
+                  <a:schemeClr val="bg1"/>
+                </a:solidFill>
+                <a:latin typeface="Verdana" charset="0"/>
+                <a:ea typeface="Microsoft YaHei" charset="0"/>
+                <a:cs typeface="Microsoft YaHei" charset="0"/>
+              </a:defRPr>
+            </a:lvl1pPr>
+            <a:lvl2pPr eaLnBrk="0" hangingPunct="0">
+              <a:tabLst>
+                <a:tab pos="457200" algn="l"/>
+                <a:tab pos="914400" algn="l"/>
+                <a:tab pos="1371600" algn="l"/>
+                <a:tab pos="1828800" algn="l"/>
+                <a:tab pos="2286000" algn="l"/>
+                <a:tab pos="2743200" algn="l"/>
+              </a:tabLst>
+              <a:defRPr sz="2400" b="1">
+                <a:solidFill>
+                  <a:schemeClr val="bg1"/>
+                </a:solidFill>
+                <a:latin typeface="Verdana" charset="0"/>
+                <a:ea typeface="Microsoft YaHei" charset="0"/>
+                <a:cs typeface="Microsoft YaHei" charset="0"/>
+              </a:defRPr>
+            </a:lvl2pPr>
+            <a:lvl3pPr eaLnBrk="0" hangingPunct="0">
+              <a:tabLst>
+                <a:tab pos="457200" algn="l"/>
+                <a:tab pos="914400" algn="l"/>
+                <a:tab pos="1371600" algn="l"/>
+                <a:tab pos="1828800" algn="l"/>
+                <a:tab pos="2286000" algn="l"/>
+                <a:tab pos="2743200" algn="l"/>
+              </a:tabLst>
+              <a:defRPr sz="2400" b="1">
+                <a:solidFill>
+                  <a:schemeClr val="bg1"/>
+                </a:solidFill>
+                <a:latin typeface="Verdana" charset="0"/>
+                <a:ea typeface="Microsoft YaHei" charset="0"/>
+                <a:cs typeface="Microsoft YaHei" charset="0"/>
+              </a:defRPr>
+            </a:lvl3pPr>
+            <a:lvl4pPr eaLnBrk="0" hangingPunct="0">
+              <a:tabLst>
+                <a:tab pos="457200" algn="l"/>
+                <a:tab pos="914400" algn="l"/>
+                <a:tab pos="1371600" algn="l"/>
+                <a:tab pos="1828800" algn="l"/>
+                <a:tab pos="2286000" algn="l"/>
+                <a:tab pos="2743200" algn="l"/>
+              </a:tabLst>
+              <a:defRPr sz="2400" b="1">
+                <a:solidFill>
+                  <a:schemeClr val="bg1"/>
+                </a:solidFill>
+                <a:latin typeface="Verdana" charset="0"/>
+                <a:ea typeface="Microsoft YaHei" charset="0"/>
+                <a:cs typeface="Microsoft YaHei" charset="0"/>
+              </a:defRPr>
+            </a:lvl4pPr>
+            <a:lvl5pPr eaLnBrk="0" hangingPunct="0">
+              <a:tabLst>
+                <a:tab pos="457200" algn="l"/>
+                <a:tab pos="914400" algn="l"/>
+                <a:tab pos="1371600" algn="l"/>
+                <a:tab pos="1828800" algn="l"/>
+                <a:tab pos="2286000" algn="l"/>
+                <a:tab pos="2743200" algn="l"/>
+              </a:tabLst>
+              <a:defRPr sz="2400" b="1">
+                <a:solidFill>
+                  <a:schemeClr val="bg1"/>
+                </a:solidFill>
+                <a:latin typeface="Verdana" charset="0"/>
+                <a:ea typeface="Microsoft YaHei" charset="0"/>
+                <a:cs typeface="Microsoft YaHei" charset="0"/>
+              </a:defRPr>
+            </a:lvl5pPr>
+            <a:lvl6pPr marL="2514600" indent="-228600" eaLnBrk="0" fontAlgn="base" hangingPunct="0">
+              <a:spcBef>
+                <a:spcPct val="0"/>
+              </a:spcBef>
+              <a:spcAft>
+                <a:spcPct val="0"/>
+              </a:spcAft>
+              <a:buClr>
+                <a:srgbClr val="000000"/>
+              </a:buClr>
+              <a:buSzPct val="100000"/>
+              <a:buFont typeface="Times New Roman" charset="0"/>
+              <a:tabLst>
+                <a:tab pos="457200" algn="l"/>
+                <a:tab pos="914400" algn="l"/>
+                <a:tab pos="1371600" algn="l"/>
+                <a:tab pos="1828800" algn="l"/>
+                <a:tab pos="2286000" algn="l"/>
+                <a:tab pos="2743200" algn="l"/>
+              </a:tabLst>
+              <a:defRPr sz="2400" b="1">
+                <a:solidFill>
+                  <a:schemeClr val="bg1"/>
+                </a:solidFill>
+                <a:latin typeface="Verdana" charset="0"/>
+                <a:ea typeface="Microsoft YaHei" charset="0"/>
+                <a:cs typeface="Microsoft YaHei" charset="0"/>
+              </a:defRPr>
+            </a:lvl6pPr>
+            <a:lvl7pPr marL="2971800" indent="-228600" eaLnBrk="0" fontAlgn="base" hangingPunct="0">
+              <a:spcBef>
+                <a:spcPct val="0"/>
+              </a:spcBef>
+              <a:spcAft>
+                <a:spcPct val="0"/>
+              </a:spcAft>
+              <a:buClr>
+                <a:srgbClr val="000000"/>
+              </a:buClr>
+              <a:buSzPct val="100000"/>
+              <a:buFont typeface="Times New Roman" charset="0"/>
+              <a:tabLst>
+                <a:tab pos="457200" algn="l"/>
+                <a:tab pos="914400" algn="l"/>
+                <a:tab pos="1371600" algn="l"/>
+                <a:tab pos="1828800" algn="l"/>
+                <a:tab pos="2286000" algn="l"/>
+                <a:tab pos="2743200" algn="l"/>
+              </a:tabLst>
+              <a:defRPr sz="2400" b="1">
+                <a:solidFill>
+                  <a:schemeClr val="bg1"/>
+                </a:solidFill>
+                <a:latin typeface="Verdana" charset="0"/>
+                <a:ea typeface="Microsoft YaHei" charset="0"/>
+                <a:cs typeface="Microsoft YaHei" charset="0"/>
+              </a:defRPr>
+            </a:lvl7pPr>
+            <a:lvl8pPr marL="3429000" indent="-228600" eaLnBrk="0" fontAlgn="base" hangingPunct="0">
+              <a:spcBef>
+                <a:spcPct val="0"/>
+              </a:spcBef>
+              <a:spcAft>
+                <a:spcPct val="0"/>
+              </a:spcAft>
+              <a:buClr>
+                <a:srgbClr val="000000"/>
+              </a:buClr>
+              <a:buSzPct val="100000"/>
+              <a:buFont typeface="Times New Roman" charset="0"/>
+              <a:tabLst>
+                <a:tab pos="457200" algn="l"/>
+                <a:tab pos="914400" algn="l"/>
+                <a:tab pos="1371600" algn="l"/>
+                <a:tab pos="1828800" algn="l"/>
+                <a:tab pos="2286000" algn="l"/>
+                <a:tab pos="2743200" algn="l"/>
+              </a:tabLst>
+              <a:defRPr sz="2400" b="1">
+                <a:solidFill>
+                  <a:schemeClr val="bg1"/>
+                </a:solidFill>
+                <a:latin typeface="Verdana" charset="0"/>
+                <a:ea typeface="Microsoft YaHei" charset="0"/>
+                <a:cs typeface="Microsoft YaHei" charset="0"/>
+              </a:defRPr>
+            </a:lvl8pPr>
+            <a:lvl9pPr marL="3886200" indent="-228600" eaLnBrk="0" fontAlgn="base" hangingPunct="0">
+              <a:spcBef>
+                <a:spcPct val="0"/>
+              </a:spcBef>
+              <a:spcAft>
+                <a:spcPct val="0"/>
+              </a:spcAft>
+              <a:buClr>
+                <a:srgbClr val="000000"/>
+              </a:buClr>
+              <a:buSzPct val="100000"/>
+              <a:buFont typeface="Times New Roman" charset="0"/>
+              <a:tabLst>
+                <a:tab pos="457200" algn="l"/>
+                <a:tab pos="914400" algn="l"/>
+                <a:tab pos="1371600" algn="l"/>
+                <a:tab pos="1828800" algn="l"/>
+                <a:tab pos="2286000" algn="l"/>
+                <a:tab pos="2743200" algn="l"/>
+              </a:tabLst>
+              <a:defRPr sz="2400" b="1">
+                <a:solidFill>
+                  <a:schemeClr val="bg1"/>
+                </a:solidFill>
+                <a:latin typeface="Verdana" charset="0"/>
+                <a:ea typeface="Microsoft YaHei" charset="0"/>
+                <a:cs typeface="Microsoft YaHei" charset="0"/>
+              </a:defRPr>
+            </a:lvl9pPr>
+          </a:lstStyle>
+          <a:p>
+            <a:pPr eaLnBrk="1" hangingPunct="1"/>
+            <a:fld id="{AACA8C16-4EC5-8942-BBA2-0F7724B98F40}" type="slidenum">
+              <a:rPr lang="en-US" sz="1300">
+                <a:solidFill>
+                  <a:srgbClr val="000000"/>
+                </a:solidFill>
+                <a:latin typeface="Tahoma" charset="0"/>
+              </a:rPr>
+              <a:pPr eaLnBrk="1" hangingPunct="1"/>
+              <a:t>6</a:t>
             </a:fld>
             <a:endParaRPr lang="en-US" sz="1300">
               <a:solidFill>
@@ -8699,6 +9066,944 @@
 </file>
 
 <file path=ppt/slides/slide6.xml><?xml version="1.0" encoding="utf-8"?>
+<p:sld xmlns:a="http://schemas.openxmlformats.org/drawingml/2006/main" xmlns:r="http://schemas.openxmlformats.org/officeDocument/2006/relationships" xmlns:p="http://schemas.openxmlformats.org/presentationml/2006/main">
+  <p:cSld>
+    <p:spTree>
+      <p:nvGrpSpPr>
+        <p:cNvPr id="1" name=""/>
+        <p:cNvGrpSpPr/>
+        <p:nvPr/>
+      </p:nvGrpSpPr>
+      <p:grpSpPr>
+        <a:xfrm>
+          <a:off x="0" y="0"/>
+          <a:ext cx="0" cy="0"/>
+          <a:chOff x="0" y="0"/>
+          <a:chExt cx="0" cy="0"/>
+        </a:xfrm>
+      </p:grpSpPr>
+      <p:sp>
+        <p:nvSpPr>
+          <p:cNvPr id="17409" name="Text Box 1"/>
+          <p:cNvSpPr txBox="1">
+            <a:spLocks noChangeArrowheads="1"/>
+          </p:cNvSpPr>
+          <p:nvPr/>
+        </p:nvSpPr>
+        <p:spPr bwMode="auto">
+          <a:xfrm>
+            <a:off x="228600" y="0"/>
+            <a:ext cx="8229600" cy="1139825"/>
+          </a:xfrm>
+          <a:prstGeom prst="rect">
+            <a:avLst/>
+          </a:prstGeom>
+          <a:noFill/>
+          <a:ln>
+            <a:noFill/>
+          </a:ln>
+          <a:extLst>
+            <a:ext uri="{909E8E84-426E-40dd-AFC4-6F175D3DCCD1}">
+              <a14:hiddenFill xmlns:a14="http://schemas.microsoft.com/office/drawing/2010/main">
+                <a:solidFill>
+                  <a:srgbClr val="FFFFFF"/>
+                </a:solidFill>
+              </a14:hiddenFill>
+            </a:ext>
+            <a:ext uri="{91240B29-F687-4f45-9708-019B960494DF}">
+              <a14:hiddenLine xmlns:a14="http://schemas.microsoft.com/office/drawing/2010/main" w="9525">
+                <a:solidFill>
+                  <a:srgbClr val="000000"/>
+                </a:solidFill>
+                <a:round/>
+                <a:headEnd/>
+                <a:tailEnd/>
+              </a14:hiddenLine>
+            </a:ext>
+          </a:extLst>
+        </p:spPr>
+        <p:txBody>
+          <a:bodyPr anchor="b"/>
+          <a:lstStyle>
+            <a:lvl1pPr eaLnBrk="0" hangingPunct="0">
+              <a:tabLst>
+                <a:tab pos="0" algn="l"/>
+                <a:tab pos="457200" algn="l"/>
+                <a:tab pos="914400" algn="l"/>
+                <a:tab pos="1371600" algn="l"/>
+                <a:tab pos="1828800" algn="l"/>
+                <a:tab pos="2286000" algn="l"/>
+                <a:tab pos="2743200" algn="l"/>
+                <a:tab pos="3200400" algn="l"/>
+                <a:tab pos="3657600" algn="l"/>
+                <a:tab pos="4114800" algn="l"/>
+                <a:tab pos="4572000" algn="l"/>
+                <a:tab pos="5029200" algn="l"/>
+                <a:tab pos="5486400" algn="l"/>
+                <a:tab pos="5943600" algn="l"/>
+                <a:tab pos="6400800" algn="l"/>
+                <a:tab pos="6858000" algn="l"/>
+                <a:tab pos="7315200" algn="l"/>
+                <a:tab pos="7772400" algn="l"/>
+                <a:tab pos="8229600" algn="l"/>
+                <a:tab pos="8686800" algn="l"/>
+                <a:tab pos="9144000" algn="l"/>
+              </a:tabLst>
+              <a:defRPr sz="2400" b="1">
+                <a:solidFill>
+                  <a:schemeClr val="bg1"/>
+                </a:solidFill>
+                <a:latin typeface="Verdana" charset="0"/>
+                <a:ea typeface="Microsoft YaHei" charset="0"/>
+                <a:cs typeface="Microsoft YaHei" charset="0"/>
+              </a:defRPr>
+            </a:lvl1pPr>
+            <a:lvl2pPr eaLnBrk="0" hangingPunct="0">
+              <a:tabLst>
+                <a:tab pos="0" algn="l"/>
+                <a:tab pos="457200" algn="l"/>
+                <a:tab pos="914400" algn="l"/>
+                <a:tab pos="1371600" algn="l"/>
+                <a:tab pos="1828800" algn="l"/>
+                <a:tab pos="2286000" algn="l"/>
+                <a:tab pos="2743200" algn="l"/>
+                <a:tab pos="3200400" algn="l"/>
+                <a:tab pos="3657600" algn="l"/>
+                <a:tab pos="4114800" algn="l"/>
+                <a:tab pos="4572000" algn="l"/>
+                <a:tab pos="5029200" algn="l"/>
+                <a:tab pos="5486400" algn="l"/>
+                <a:tab pos="5943600" algn="l"/>
+                <a:tab pos="6400800" algn="l"/>
+                <a:tab pos="6858000" algn="l"/>
+                <a:tab pos="7315200" algn="l"/>
+                <a:tab pos="7772400" algn="l"/>
+                <a:tab pos="8229600" algn="l"/>
+                <a:tab pos="8686800" algn="l"/>
+                <a:tab pos="9144000" algn="l"/>
+              </a:tabLst>
+              <a:defRPr sz="2400" b="1">
+                <a:solidFill>
+                  <a:schemeClr val="bg1"/>
+                </a:solidFill>
+                <a:latin typeface="Verdana" charset="0"/>
+                <a:ea typeface="Microsoft YaHei" charset="0"/>
+                <a:cs typeface="Microsoft YaHei" charset="0"/>
+              </a:defRPr>
+            </a:lvl2pPr>
+            <a:lvl3pPr eaLnBrk="0" hangingPunct="0">
+              <a:tabLst>
+                <a:tab pos="0" algn="l"/>
+                <a:tab pos="457200" algn="l"/>
+                <a:tab pos="914400" algn="l"/>
+                <a:tab pos="1371600" algn="l"/>
+                <a:tab pos="1828800" algn="l"/>
+                <a:tab pos="2286000" algn="l"/>
+                <a:tab pos="2743200" algn="l"/>
+                <a:tab pos="3200400" algn="l"/>
+                <a:tab pos="3657600" algn="l"/>
+                <a:tab pos="4114800" algn="l"/>
+                <a:tab pos="4572000" algn="l"/>
+                <a:tab pos="5029200" algn="l"/>
+                <a:tab pos="5486400" algn="l"/>
+                <a:tab pos="5943600" algn="l"/>
+                <a:tab pos="6400800" algn="l"/>
+                <a:tab pos="6858000" algn="l"/>
+                <a:tab pos="7315200" algn="l"/>
+                <a:tab pos="7772400" algn="l"/>
+                <a:tab pos="8229600" algn="l"/>
+                <a:tab pos="8686800" algn="l"/>
+                <a:tab pos="9144000" algn="l"/>
+              </a:tabLst>
+              <a:defRPr sz="2400" b="1">
+                <a:solidFill>
+                  <a:schemeClr val="bg1"/>
+                </a:solidFill>
+                <a:latin typeface="Verdana" charset="0"/>
+                <a:ea typeface="Microsoft YaHei" charset="0"/>
+                <a:cs typeface="Microsoft YaHei" charset="0"/>
+              </a:defRPr>
+            </a:lvl3pPr>
+            <a:lvl4pPr eaLnBrk="0" hangingPunct="0">
+              <a:tabLst>
+                <a:tab pos="0" algn="l"/>
+                <a:tab pos="457200" algn="l"/>
+                <a:tab pos="914400" algn="l"/>
+                <a:tab pos="1371600" algn="l"/>
+                <a:tab pos="1828800" algn="l"/>
+                <a:tab pos="2286000" algn="l"/>
+                <a:tab pos="2743200" algn="l"/>
+                <a:tab pos="3200400" algn="l"/>
+                <a:tab pos="3657600" algn="l"/>
+                <a:tab pos="4114800" algn="l"/>
+                <a:tab pos="4572000" algn="l"/>
+                <a:tab pos="5029200" algn="l"/>
+                <a:tab pos="5486400" algn="l"/>
+                <a:tab pos="5943600" algn="l"/>
+                <a:tab pos="6400800" algn="l"/>
+                <a:tab pos="6858000" algn="l"/>
+                <a:tab pos="7315200" algn="l"/>
+                <a:tab pos="7772400" algn="l"/>
+                <a:tab pos="8229600" algn="l"/>
+                <a:tab pos="8686800" algn="l"/>
+                <a:tab pos="9144000" algn="l"/>
+              </a:tabLst>
+              <a:defRPr sz="2400" b="1">
+                <a:solidFill>
+                  <a:schemeClr val="bg1"/>
+                </a:solidFill>
+                <a:latin typeface="Verdana" charset="0"/>
+                <a:ea typeface="Microsoft YaHei" charset="0"/>
+                <a:cs typeface="Microsoft YaHei" charset="0"/>
+              </a:defRPr>
+            </a:lvl4pPr>
+            <a:lvl5pPr eaLnBrk="0" hangingPunct="0">
+              <a:tabLst>
+                <a:tab pos="0" algn="l"/>
+                <a:tab pos="457200" algn="l"/>
+                <a:tab pos="914400" algn="l"/>
+                <a:tab pos="1371600" algn="l"/>
+                <a:tab pos="1828800" algn="l"/>
+                <a:tab pos="2286000" algn="l"/>
+                <a:tab pos="2743200" algn="l"/>
+                <a:tab pos="3200400" algn="l"/>
+                <a:tab pos="3657600" algn="l"/>
+                <a:tab pos="4114800" algn="l"/>
+                <a:tab pos="4572000" algn="l"/>
+                <a:tab pos="5029200" algn="l"/>
+                <a:tab pos="5486400" algn="l"/>
+                <a:tab pos="5943600" algn="l"/>
+                <a:tab pos="6400800" algn="l"/>
+                <a:tab pos="6858000" algn="l"/>
+                <a:tab pos="7315200" algn="l"/>
+                <a:tab pos="7772400" algn="l"/>
+                <a:tab pos="8229600" algn="l"/>
+                <a:tab pos="8686800" algn="l"/>
+                <a:tab pos="9144000" algn="l"/>
+              </a:tabLst>
+              <a:defRPr sz="2400" b="1">
+                <a:solidFill>
+                  <a:schemeClr val="bg1"/>
+                </a:solidFill>
+                <a:latin typeface="Verdana" charset="0"/>
+                <a:ea typeface="Microsoft YaHei" charset="0"/>
+                <a:cs typeface="Microsoft YaHei" charset="0"/>
+              </a:defRPr>
+            </a:lvl5pPr>
+            <a:lvl6pPr marL="2514600" indent="-228600" eaLnBrk="0" fontAlgn="base" hangingPunct="0">
+              <a:spcBef>
+                <a:spcPct val="0"/>
+              </a:spcBef>
+              <a:spcAft>
+                <a:spcPct val="0"/>
+              </a:spcAft>
+              <a:buClr>
+                <a:srgbClr val="000000"/>
+              </a:buClr>
+              <a:buSzPct val="100000"/>
+              <a:buFont typeface="Times New Roman" charset="0"/>
+              <a:tabLst>
+                <a:tab pos="0" algn="l"/>
+                <a:tab pos="457200" algn="l"/>
+                <a:tab pos="914400" algn="l"/>
+                <a:tab pos="1371600" algn="l"/>
+                <a:tab pos="1828800" algn="l"/>
+                <a:tab pos="2286000" algn="l"/>
+                <a:tab pos="2743200" algn="l"/>
+                <a:tab pos="3200400" algn="l"/>
+                <a:tab pos="3657600" algn="l"/>
+                <a:tab pos="4114800" algn="l"/>
+                <a:tab pos="4572000" algn="l"/>
+                <a:tab pos="5029200" algn="l"/>
+                <a:tab pos="5486400" algn="l"/>
+                <a:tab pos="5943600" algn="l"/>
+                <a:tab pos="6400800" algn="l"/>
+                <a:tab pos="6858000" algn="l"/>
+                <a:tab pos="7315200" algn="l"/>
+                <a:tab pos="7772400" algn="l"/>
+                <a:tab pos="8229600" algn="l"/>
+                <a:tab pos="8686800" algn="l"/>
+                <a:tab pos="9144000" algn="l"/>
+              </a:tabLst>
+              <a:defRPr sz="2400" b="1">
+                <a:solidFill>
+                  <a:schemeClr val="bg1"/>
+                </a:solidFill>
+                <a:latin typeface="Verdana" charset="0"/>
+                <a:ea typeface="Microsoft YaHei" charset="0"/>
+                <a:cs typeface="Microsoft YaHei" charset="0"/>
+              </a:defRPr>
+            </a:lvl6pPr>
+            <a:lvl7pPr marL="2971800" indent="-228600" eaLnBrk="0" fontAlgn="base" hangingPunct="0">
+              <a:spcBef>
+                <a:spcPct val="0"/>
+              </a:spcBef>
+              <a:spcAft>
+                <a:spcPct val="0"/>
+              </a:spcAft>
+              <a:buClr>
+                <a:srgbClr val="000000"/>
+              </a:buClr>
+              <a:buSzPct val="100000"/>
+              <a:buFont typeface="Times New Roman" charset="0"/>
+              <a:tabLst>
+                <a:tab pos="0" algn="l"/>
+                <a:tab pos="457200" algn="l"/>
+                <a:tab pos="914400" algn="l"/>
+                <a:tab pos="1371600" algn="l"/>
+                <a:tab pos="1828800" algn="l"/>
+                <a:tab pos="2286000" algn="l"/>
+                <a:tab pos="2743200" algn="l"/>
+                <a:tab pos="3200400" algn="l"/>
+                <a:tab pos="3657600" algn="l"/>
+                <a:tab pos="4114800" algn="l"/>
+                <a:tab pos="4572000" algn="l"/>
+                <a:tab pos="5029200" algn="l"/>
+                <a:tab pos="5486400" algn="l"/>
+                <a:tab pos="5943600" algn="l"/>
+                <a:tab pos="6400800" algn="l"/>
+                <a:tab pos="6858000" algn="l"/>
+                <a:tab pos="7315200" algn="l"/>
+                <a:tab pos="7772400" algn="l"/>
+                <a:tab pos="8229600" algn="l"/>
+                <a:tab pos="8686800" algn="l"/>
+                <a:tab pos="9144000" algn="l"/>
+              </a:tabLst>
+              <a:defRPr sz="2400" b="1">
+                <a:solidFill>
+                  <a:schemeClr val="bg1"/>
+                </a:solidFill>
+                <a:latin typeface="Verdana" charset="0"/>
+                <a:ea typeface="Microsoft YaHei" charset="0"/>
+                <a:cs typeface="Microsoft YaHei" charset="0"/>
+              </a:defRPr>
+            </a:lvl7pPr>
+            <a:lvl8pPr marL="3429000" indent="-228600" eaLnBrk="0" fontAlgn="base" hangingPunct="0">
+              <a:spcBef>
+                <a:spcPct val="0"/>
+              </a:spcBef>
+              <a:spcAft>
+                <a:spcPct val="0"/>
+              </a:spcAft>
+              <a:buClr>
+                <a:srgbClr val="000000"/>
+              </a:buClr>
+              <a:buSzPct val="100000"/>
+              <a:buFont typeface="Times New Roman" charset="0"/>
+              <a:tabLst>
+                <a:tab pos="0" algn="l"/>
+                <a:tab pos="457200" algn="l"/>
+                <a:tab pos="914400" algn="l"/>
+                <a:tab pos="1371600" algn="l"/>
+                <a:tab pos="1828800" algn="l"/>
+                <a:tab pos="2286000" algn="l"/>
+                <a:tab pos="2743200" algn="l"/>
+                <a:tab pos="3200400" algn="l"/>
+                <a:tab pos="3657600" algn="l"/>
+                <a:tab pos="4114800" algn="l"/>
+                <a:tab pos="4572000" algn="l"/>
+                <a:tab pos="5029200" algn="l"/>
+                <a:tab pos="5486400" algn="l"/>
+                <a:tab pos="5943600" algn="l"/>
+                <a:tab pos="6400800" algn="l"/>
+                <a:tab pos="6858000" algn="l"/>
+                <a:tab pos="7315200" algn="l"/>
+                <a:tab pos="7772400" algn="l"/>
+                <a:tab pos="8229600" algn="l"/>
+                <a:tab pos="8686800" algn="l"/>
+                <a:tab pos="9144000" algn="l"/>
+              </a:tabLst>
+              <a:defRPr sz="2400" b="1">
+                <a:solidFill>
+                  <a:schemeClr val="bg1"/>
+                </a:solidFill>
+                <a:latin typeface="Verdana" charset="0"/>
+                <a:ea typeface="Microsoft YaHei" charset="0"/>
+                <a:cs typeface="Microsoft YaHei" charset="0"/>
+              </a:defRPr>
+            </a:lvl8pPr>
+            <a:lvl9pPr marL="3886200" indent="-228600" eaLnBrk="0" fontAlgn="base" hangingPunct="0">
+              <a:spcBef>
+                <a:spcPct val="0"/>
+              </a:spcBef>
+              <a:spcAft>
+                <a:spcPct val="0"/>
+              </a:spcAft>
+              <a:buClr>
+                <a:srgbClr val="000000"/>
+              </a:buClr>
+              <a:buSzPct val="100000"/>
+              <a:buFont typeface="Times New Roman" charset="0"/>
+              <a:tabLst>
+                <a:tab pos="0" algn="l"/>
+                <a:tab pos="457200" algn="l"/>
+                <a:tab pos="914400" algn="l"/>
+                <a:tab pos="1371600" algn="l"/>
+                <a:tab pos="1828800" algn="l"/>
+                <a:tab pos="2286000" algn="l"/>
+                <a:tab pos="2743200" algn="l"/>
+                <a:tab pos="3200400" algn="l"/>
+                <a:tab pos="3657600" algn="l"/>
+                <a:tab pos="4114800" algn="l"/>
+                <a:tab pos="4572000" algn="l"/>
+                <a:tab pos="5029200" algn="l"/>
+                <a:tab pos="5486400" algn="l"/>
+                <a:tab pos="5943600" algn="l"/>
+                <a:tab pos="6400800" algn="l"/>
+                <a:tab pos="6858000" algn="l"/>
+                <a:tab pos="7315200" algn="l"/>
+                <a:tab pos="7772400" algn="l"/>
+                <a:tab pos="8229600" algn="l"/>
+                <a:tab pos="8686800" algn="l"/>
+                <a:tab pos="9144000" algn="l"/>
+              </a:tabLst>
+              <a:defRPr sz="2400" b="1">
+                <a:solidFill>
+                  <a:schemeClr val="bg1"/>
+                </a:solidFill>
+                <a:latin typeface="Verdana" charset="0"/>
+                <a:ea typeface="Microsoft YaHei" charset="0"/>
+                <a:cs typeface="Microsoft YaHei" charset="0"/>
+              </a:defRPr>
+            </a:lvl9pPr>
+          </a:lstStyle>
+          <a:p>
+            <a:pPr eaLnBrk="1" hangingPunct="1">
+              <a:buClrTx/>
+              <a:buFontTx/>
+              <a:buNone/>
+            </a:pPr>
+            <a:r>
+              <a:rPr lang="en-US" sz="4400" b="0" dirty="0" smtClean="0">
+                <a:solidFill>
+                  <a:srgbClr val="800000"/>
+                </a:solidFill>
+                <a:latin typeface="Arial" charset="0"/>
+              </a:rPr>
+              <a:t>Next </a:t>
+            </a:r>
+            <a:r>
+              <a:rPr lang="en-US" sz="4400" b="0" smtClean="0">
+                <a:solidFill>
+                  <a:srgbClr val="800000"/>
+                </a:solidFill>
+                <a:latin typeface="Arial" charset="0"/>
+              </a:rPr>
+              <a:t>(proposal)</a:t>
+            </a:r>
+            <a:endParaRPr lang="en-US" sz="4400" b="0" dirty="0">
+              <a:solidFill>
+                <a:srgbClr val="800000"/>
+              </a:solidFill>
+              <a:latin typeface="Arial" charset="0"/>
+            </a:endParaRPr>
+          </a:p>
+        </p:txBody>
+      </p:sp>
+      <p:sp>
+        <p:nvSpPr>
+          <p:cNvPr id="17410" name="Text Box 2"/>
+          <p:cNvSpPr txBox="1">
+            <a:spLocks noChangeArrowheads="1"/>
+          </p:cNvSpPr>
+          <p:nvPr/>
+        </p:nvSpPr>
+        <p:spPr bwMode="auto">
+          <a:xfrm>
+            <a:off x="1295400" y="2895600"/>
+            <a:ext cx="6934200" cy="1828800"/>
+          </a:xfrm>
+          <a:prstGeom prst="rect">
+            <a:avLst/>
+          </a:prstGeom>
+          <a:noFill/>
+          <a:ln>
+            <a:noFill/>
+          </a:ln>
+          <a:extLst>
+            <a:ext uri="{909E8E84-426E-40dd-AFC4-6F175D3DCCD1}">
+              <a14:hiddenFill xmlns:a14="http://schemas.microsoft.com/office/drawing/2010/main">
+                <a:solidFill>
+                  <a:srgbClr val="FFFFFF"/>
+                </a:solidFill>
+              </a14:hiddenFill>
+            </a:ext>
+            <a:ext uri="{91240B29-F687-4f45-9708-019B960494DF}">
+              <a14:hiddenLine xmlns:a14="http://schemas.microsoft.com/office/drawing/2010/main" w="9525">
+                <a:solidFill>
+                  <a:srgbClr val="000000"/>
+                </a:solidFill>
+                <a:round/>
+                <a:headEnd/>
+                <a:tailEnd/>
+              </a14:hiddenLine>
+            </a:ext>
+          </a:extLst>
+        </p:spPr>
+        <p:txBody>
+          <a:bodyPr/>
+          <a:lstStyle>
+            <a:lvl1pPr marL="338138" indent="-338138" eaLnBrk="0" hangingPunct="0">
+              <a:tabLst>
+                <a:tab pos="338138" algn="l"/>
+                <a:tab pos="795338" algn="l"/>
+                <a:tab pos="1252538" algn="l"/>
+                <a:tab pos="1709738" algn="l"/>
+                <a:tab pos="2166938" algn="l"/>
+                <a:tab pos="2624138" algn="l"/>
+                <a:tab pos="3081338" algn="l"/>
+                <a:tab pos="3538538" algn="l"/>
+                <a:tab pos="3995738" algn="l"/>
+                <a:tab pos="4452938" algn="l"/>
+                <a:tab pos="4910138" algn="l"/>
+                <a:tab pos="5367338" algn="l"/>
+                <a:tab pos="5824538" algn="l"/>
+                <a:tab pos="6281738" algn="l"/>
+                <a:tab pos="6738938" algn="l"/>
+                <a:tab pos="7196138" algn="l"/>
+                <a:tab pos="7653338" algn="l"/>
+                <a:tab pos="8110538" algn="l"/>
+                <a:tab pos="8567738" algn="l"/>
+                <a:tab pos="9024938" algn="l"/>
+                <a:tab pos="9482138" algn="l"/>
+              </a:tabLst>
+              <a:defRPr sz="2400" b="1">
+                <a:solidFill>
+                  <a:schemeClr val="bg1"/>
+                </a:solidFill>
+                <a:latin typeface="Verdana" charset="0"/>
+                <a:ea typeface="Microsoft YaHei" charset="0"/>
+                <a:cs typeface="Microsoft YaHei" charset="0"/>
+              </a:defRPr>
+            </a:lvl1pPr>
+            <a:lvl2pPr eaLnBrk="0" hangingPunct="0">
+              <a:tabLst>
+                <a:tab pos="338138" algn="l"/>
+                <a:tab pos="795338" algn="l"/>
+                <a:tab pos="1252538" algn="l"/>
+                <a:tab pos="1709738" algn="l"/>
+                <a:tab pos="2166938" algn="l"/>
+                <a:tab pos="2624138" algn="l"/>
+                <a:tab pos="3081338" algn="l"/>
+                <a:tab pos="3538538" algn="l"/>
+                <a:tab pos="3995738" algn="l"/>
+                <a:tab pos="4452938" algn="l"/>
+                <a:tab pos="4910138" algn="l"/>
+                <a:tab pos="5367338" algn="l"/>
+                <a:tab pos="5824538" algn="l"/>
+                <a:tab pos="6281738" algn="l"/>
+                <a:tab pos="6738938" algn="l"/>
+                <a:tab pos="7196138" algn="l"/>
+                <a:tab pos="7653338" algn="l"/>
+                <a:tab pos="8110538" algn="l"/>
+                <a:tab pos="8567738" algn="l"/>
+                <a:tab pos="9024938" algn="l"/>
+                <a:tab pos="9482138" algn="l"/>
+              </a:tabLst>
+              <a:defRPr sz="2400" b="1">
+                <a:solidFill>
+                  <a:schemeClr val="bg1"/>
+                </a:solidFill>
+                <a:latin typeface="Verdana" charset="0"/>
+                <a:ea typeface="Microsoft YaHei" charset="0"/>
+                <a:cs typeface="Microsoft YaHei" charset="0"/>
+              </a:defRPr>
+            </a:lvl2pPr>
+            <a:lvl3pPr eaLnBrk="0" hangingPunct="0">
+              <a:tabLst>
+                <a:tab pos="338138" algn="l"/>
+                <a:tab pos="795338" algn="l"/>
+                <a:tab pos="1252538" algn="l"/>
+                <a:tab pos="1709738" algn="l"/>
+                <a:tab pos="2166938" algn="l"/>
+                <a:tab pos="2624138" algn="l"/>
+                <a:tab pos="3081338" algn="l"/>
+                <a:tab pos="3538538" algn="l"/>
+                <a:tab pos="3995738" algn="l"/>
+                <a:tab pos="4452938" algn="l"/>
+                <a:tab pos="4910138" algn="l"/>
+                <a:tab pos="5367338" algn="l"/>
+                <a:tab pos="5824538" algn="l"/>
+                <a:tab pos="6281738" algn="l"/>
+                <a:tab pos="6738938" algn="l"/>
+                <a:tab pos="7196138" algn="l"/>
+                <a:tab pos="7653338" algn="l"/>
+                <a:tab pos="8110538" algn="l"/>
+                <a:tab pos="8567738" algn="l"/>
+                <a:tab pos="9024938" algn="l"/>
+                <a:tab pos="9482138" algn="l"/>
+              </a:tabLst>
+              <a:defRPr sz="2400" b="1">
+                <a:solidFill>
+                  <a:schemeClr val="bg1"/>
+                </a:solidFill>
+                <a:latin typeface="Verdana" charset="0"/>
+                <a:ea typeface="Microsoft YaHei" charset="0"/>
+                <a:cs typeface="Microsoft YaHei" charset="0"/>
+              </a:defRPr>
+            </a:lvl3pPr>
+            <a:lvl4pPr eaLnBrk="0" hangingPunct="0">
+              <a:tabLst>
+                <a:tab pos="338138" algn="l"/>
+                <a:tab pos="795338" algn="l"/>
+                <a:tab pos="1252538" algn="l"/>
+                <a:tab pos="1709738" algn="l"/>
+                <a:tab pos="2166938" algn="l"/>
+                <a:tab pos="2624138" algn="l"/>
+                <a:tab pos="3081338" algn="l"/>
+                <a:tab pos="3538538" algn="l"/>
+                <a:tab pos="3995738" algn="l"/>
+                <a:tab pos="4452938" algn="l"/>
+                <a:tab pos="4910138" algn="l"/>
+                <a:tab pos="5367338" algn="l"/>
+                <a:tab pos="5824538" algn="l"/>
+                <a:tab pos="6281738" algn="l"/>
+                <a:tab pos="6738938" algn="l"/>
+                <a:tab pos="7196138" algn="l"/>
+                <a:tab pos="7653338" algn="l"/>
+                <a:tab pos="8110538" algn="l"/>
+                <a:tab pos="8567738" algn="l"/>
+                <a:tab pos="9024938" algn="l"/>
+                <a:tab pos="9482138" algn="l"/>
+              </a:tabLst>
+              <a:defRPr sz="2400" b="1">
+                <a:solidFill>
+                  <a:schemeClr val="bg1"/>
+                </a:solidFill>
+                <a:latin typeface="Verdana" charset="0"/>
+                <a:ea typeface="Microsoft YaHei" charset="0"/>
+                <a:cs typeface="Microsoft YaHei" charset="0"/>
+              </a:defRPr>
+            </a:lvl4pPr>
+            <a:lvl5pPr eaLnBrk="0" hangingPunct="0">
+              <a:tabLst>
+                <a:tab pos="338138" algn="l"/>
+                <a:tab pos="795338" algn="l"/>
+                <a:tab pos="1252538" algn="l"/>
+                <a:tab pos="1709738" algn="l"/>
+                <a:tab pos="2166938" algn="l"/>
+                <a:tab pos="2624138" algn="l"/>
+                <a:tab pos="3081338" algn="l"/>
+                <a:tab pos="3538538" algn="l"/>
+                <a:tab pos="3995738" algn="l"/>
+                <a:tab pos="4452938" algn="l"/>
+                <a:tab pos="4910138" algn="l"/>
+                <a:tab pos="5367338" algn="l"/>
+                <a:tab pos="5824538" algn="l"/>
+                <a:tab pos="6281738" algn="l"/>
+                <a:tab pos="6738938" algn="l"/>
+                <a:tab pos="7196138" algn="l"/>
+                <a:tab pos="7653338" algn="l"/>
+                <a:tab pos="8110538" algn="l"/>
+                <a:tab pos="8567738" algn="l"/>
+                <a:tab pos="9024938" algn="l"/>
+                <a:tab pos="9482138" algn="l"/>
+              </a:tabLst>
+              <a:defRPr sz="2400" b="1">
+                <a:solidFill>
+                  <a:schemeClr val="bg1"/>
+                </a:solidFill>
+                <a:latin typeface="Verdana" charset="0"/>
+                <a:ea typeface="Microsoft YaHei" charset="0"/>
+                <a:cs typeface="Microsoft YaHei" charset="0"/>
+              </a:defRPr>
+            </a:lvl5pPr>
+            <a:lvl6pPr marL="2514600" indent="-228600" eaLnBrk="0" fontAlgn="base" hangingPunct="0">
+              <a:spcBef>
+                <a:spcPct val="0"/>
+              </a:spcBef>
+              <a:spcAft>
+                <a:spcPct val="0"/>
+              </a:spcAft>
+              <a:buClr>
+                <a:srgbClr val="000000"/>
+              </a:buClr>
+              <a:buSzPct val="100000"/>
+              <a:buFont typeface="Times New Roman" charset="0"/>
+              <a:tabLst>
+                <a:tab pos="338138" algn="l"/>
+                <a:tab pos="795338" algn="l"/>
+                <a:tab pos="1252538" algn="l"/>
+                <a:tab pos="1709738" algn="l"/>
+                <a:tab pos="2166938" algn="l"/>
+                <a:tab pos="2624138" algn="l"/>
+                <a:tab pos="3081338" algn="l"/>
+                <a:tab pos="3538538" algn="l"/>
+                <a:tab pos="3995738" algn="l"/>
+                <a:tab pos="4452938" algn="l"/>
+                <a:tab pos="4910138" algn="l"/>
+                <a:tab pos="5367338" algn="l"/>
+                <a:tab pos="5824538" algn="l"/>
+                <a:tab pos="6281738" algn="l"/>
+                <a:tab pos="6738938" algn="l"/>
+                <a:tab pos="7196138" algn="l"/>
+                <a:tab pos="7653338" algn="l"/>
+                <a:tab pos="8110538" algn="l"/>
+                <a:tab pos="8567738" algn="l"/>
+                <a:tab pos="9024938" algn="l"/>
+                <a:tab pos="9482138" algn="l"/>
+              </a:tabLst>
+              <a:defRPr sz="2400" b="1">
+                <a:solidFill>
+                  <a:schemeClr val="bg1"/>
+                </a:solidFill>
+                <a:latin typeface="Verdana" charset="0"/>
+                <a:ea typeface="Microsoft YaHei" charset="0"/>
+                <a:cs typeface="Microsoft YaHei" charset="0"/>
+              </a:defRPr>
+            </a:lvl6pPr>
+            <a:lvl7pPr marL="2971800" indent="-228600" eaLnBrk="0" fontAlgn="base" hangingPunct="0">
+              <a:spcBef>
+                <a:spcPct val="0"/>
+              </a:spcBef>
+              <a:spcAft>
+                <a:spcPct val="0"/>
+              </a:spcAft>
+              <a:buClr>
+                <a:srgbClr val="000000"/>
+              </a:buClr>
+              <a:buSzPct val="100000"/>
+              <a:buFont typeface="Times New Roman" charset="0"/>
+              <a:tabLst>
+                <a:tab pos="338138" algn="l"/>
+                <a:tab pos="795338" algn="l"/>
+                <a:tab pos="1252538" algn="l"/>
+                <a:tab pos="1709738" algn="l"/>
+                <a:tab pos="2166938" algn="l"/>
+                <a:tab pos="2624138" algn="l"/>
+                <a:tab pos="3081338" algn="l"/>
+                <a:tab pos="3538538" algn="l"/>
+                <a:tab pos="3995738" algn="l"/>
+                <a:tab pos="4452938" algn="l"/>
+                <a:tab pos="4910138" algn="l"/>
+                <a:tab pos="5367338" algn="l"/>
+                <a:tab pos="5824538" algn="l"/>
+                <a:tab pos="6281738" algn="l"/>
+                <a:tab pos="6738938" algn="l"/>
+                <a:tab pos="7196138" algn="l"/>
+                <a:tab pos="7653338" algn="l"/>
+                <a:tab pos="8110538" algn="l"/>
+                <a:tab pos="8567738" algn="l"/>
+                <a:tab pos="9024938" algn="l"/>
+                <a:tab pos="9482138" algn="l"/>
+              </a:tabLst>
+              <a:defRPr sz="2400" b="1">
+                <a:solidFill>
+                  <a:schemeClr val="bg1"/>
+                </a:solidFill>
+                <a:latin typeface="Verdana" charset="0"/>
+                <a:ea typeface="Microsoft YaHei" charset="0"/>
+                <a:cs typeface="Microsoft YaHei" charset="0"/>
+              </a:defRPr>
+            </a:lvl7pPr>
+            <a:lvl8pPr marL="3429000" indent="-228600" eaLnBrk="0" fontAlgn="base" hangingPunct="0">
+              <a:spcBef>
+                <a:spcPct val="0"/>
+              </a:spcBef>
+              <a:spcAft>
+                <a:spcPct val="0"/>
+              </a:spcAft>
+              <a:buClr>
+                <a:srgbClr val="000000"/>
+              </a:buClr>
+              <a:buSzPct val="100000"/>
+              <a:buFont typeface="Times New Roman" charset="0"/>
+              <a:tabLst>
+                <a:tab pos="338138" algn="l"/>
+                <a:tab pos="795338" algn="l"/>
+                <a:tab pos="1252538" algn="l"/>
+                <a:tab pos="1709738" algn="l"/>
+                <a:tab pos="2166938" algn="l"/>
+                <a:tab pos="2624138" algn="l"/>
+                <a:tab pos="3081338" algn="l"/>
+                <a:tab pos="3538538" algn="l"/>
+                <a:tab pos="3995738" algn="l"/>
+                <a:tab pos="4452938" algn="l"/>
+                <a:tab pos="4910138" algn="l"/>
+                <a:tab pos="5367338" algn="l"/>
+                <a:tab pos="5824538" algn="l"/>
+                <a:tab pos="6281738" algn="l"/>
+                <a:tab pos="6738938" algn="l"/>
+                <a:tab pos="7196138" algn="l"/>
+                <a:tab pos="7653338" algn="l"/>
+                <a:tab pos="8110538" algn="l"/>
+                <a:tab pos="8567738" algn="l"/>
+                <a:tab pos="9024938" algn="l"/>
+                <a:tab pos="9482138" algn="l"/>
+              </a:tabLst>
+              <a:defRPr sz="2400" b="1">
+                <a:solidFill>
+                  <a:schemeClr val="bg1"/>
+                </a:solidFill>
+                <a:latin typeface="Verdana" charset="0"/>
+                <a:ea typeface="Microsoft YaHei" charset="0"/>
+                <a:cs typeface="Microsoft YaHei" charset="0"/>
+              </a:defRPr>
+            </a:lvl8pPr>
+            <a:lvl9pPr marL="3886200" indent="-228600" eaLnBrk="0" fontAlgn="base" hangingPunct="0">
+              <a:spcBef>
+                <a:spcPct val="0"/>
+              </a:spcBef>
+              <a:spcAft>
+                <a:spcPct val="0"/>
+              </a:spcAft>
+              <a:buClr>
+                <a:srgbClr val="000000"/>
+              </a:buClr>
+              <a:buSzPct val="100000"/>
+              <a:buFont typeface="Times New Roman" charset="0"/>
+              <a:tabLst>
+                <a:tab pos="338138" algn="l"/>
+                <a:tab pos="795338" algn="l"/>
+                <a:tab pos="1252538" algn="l"/>
+                <a:tab pos="1709738" algn="l"/>
+                <a:tab pos="2166938" algn="l"/>
+                <a:tab pos="2624138" algn="l"/>
+                <a:tab pos="3081338" algn="l"/>
+                <a:tab pos="3538538" algn="l"/>
+                <a:tab pos="3995738" algn="l"/>
+                <a:tab pos="4452938" algn="l"/>
+                <a:tab pos="4910138" algn="l"/>
+                <a:tab pos="5367338" algn="l"/>
+                <a:tab pos="5824538" algn="l"/>
+                <a:tab pos="6281738" algn="l"/>
+                <a:tab pos="6738938" algn="l"/>
+                <a:tab pos="7196138" algn="l"/>
+                <a:tab pos="7653338" algn="l"/>
+                <a:tab pos="8110538" algn="l"/>
+                <a:tab pos="8567738" algn="l"/>
+                <a:tab pos="9024938" algn="l"/>
+                <a:tab pos="9482138" algn="l"/>
+              </a:tabLst>
+              <a:defRPr sz="2400" b="1">
+                <a:solidFill>
+                  <a:schemeClr val="bg1"/>
+                </a:solidFill>
+                <a:latin typeface="Verdana" charset="0"/>
+                <a:ea typeface="Microsoft YaHei" charset="0"/>
+                <a:cs typeface="Microsoft YaHei" charset="0"/>
+              </a:defRPr>
+            </a:lvl9pPr>
+          </a:lstStyle>
+          <a:p>
+            <a:pPr eaLnBrk="1" hangingPunct="1">
+              <a:spcBef>
+                <a:spcPts val="600"/>
+              </a:spcBef>
+              <a:buClr>
+                <a:srgbClr val="FF9900"/>
+              </a:buClr>
+              <a:buFont typeface="Wingdings" charset="0"/>
+              <a:buChar char=""/>
+            </a:pPr>
+            <a:r>
+              <a:rPr lang="en-US" sz="2800" b="0" dirty="0" smtClean="0">
+                <a:solidFill>
+                  <a:srgbClr val="000000"/>
+                </a:solidFill>
+              </a:rPr>
+              <a:t>Consensus on goals/objectives?</a:t>
+            </a:r>
+            <a:endParaRPr lang="en-US" sz="2800" b="0" dirty="0" smtClean="0">
+              <a:solidFill>
+                <a:srgbClr val="000000"/>
+              </a:solidFill>
+            </a:endParaRPr>
+          </a:p>
+          <a:p>
+            <a:pPr eaLnBrk="1" hangingPunct="1">
+              <a:spcBef>
+                <a:spcPts val="600"/>
+              </a:spcBef>
+              <a:buClr>
+                <a:srgbClr val="FF9900"/>
+              </a:buClr>
+              <a:buFont typeface="Wingdings" charset="0"/>
+              <a:buChar char=""/>
+            </a:pPr>
+            <a:r>
+              <a:rPr lang="en-US" sz="2800" b="0" dirty="0" smtClean="0">
+                <a:solidFill>
+                  <a:srgbClr val="000000"/>
+                </a:solidFill>
+              </a:rPr>
+              <a:t>Consensus on architecture?</a:t>
+            </a:r>
+            <a:endParaRPr lang="en-US" sz="2800" b="0" dirty="0">
+              <a:solidFill>
+                <a:srgbClr val="000000"/>
+              </a:solidFill>
+            </a:endParaRPr>
+          </a:p>
+          <a:p>
+            <a:pPr eaLnBrk="1" hangingPunct="1">
+              <a:spcBef>
+                <a:spcPts val="600"/>
+              </a:spcBef>
+              <a:buClr>
+                <a:srgbClr val="FF9900"/>
+              </a:buClr>
+              <a:buFont typeface="Wingdings" charset="0"/>
+              <a:buChar char=""/>
+            </a:pPr>
+            <a:r>
+              <a:rPr lang="en-US" sz="2800" b="0" dirty="0" smtClean="0">
+                <a:solidFill>
+                  <a:srgbClr val="000000"/>
+                </a:solidFill>
+              </a:rPr>
+              <a:t>Travis: prototype end-user installer</a:t>
+            </a:r>
+            <a:endParaRPr lang="en-US" sz="2800" b="0" dirty="0">
+              <a:solidFill>
+                <a:srgbClr val="000000"/>
+              </a:solidFill>
+            </a:endParaRPr>
+          </a:p>
+        </p:txBody>
+      </p:sp>
+    </p:spTree>
+    <p:extLst>
+      <p:ext uri="{BB962C8B-B14F-4D97-AF65-F5344CB8AC3E}">
+        <p14:creationId xmlns:p14="http://schemas.microsoft.com/office/powerpoint/2010/main" val="4152941721"/>
+      </p:ext>
+    </p:extLst>
+  </p:cSld>
+  <p:clrMapOvr>
+    <a:masterClrMapping/>
+  </p:clrMapOvr>
+  <p:transition xmlns:p14="http://schemas.microsoft.com/office/powerpoint/2010/main" spd="med"/>
+  <p:timing>
+    <p:tnLst>
+      <p:par>
+        <p:cTn xmlns:p14="http://schemas.microsoft.com/office/powerpoint/2010/main" id="1" dur="indefinite" restart="never" nodeType="tmRoot">
+          <p:childTnLst>
+            <p:seq concurrent="1" nextAc="seek">
+              <p:cTn id="2" dur="indefinite" nodeType="mainSeq"/>
+              <p:prevCondLst>
+                <p:cond evt="onPrev" delay="0">
+                  <p:tgtEl>
+                    <p:sldTgt/>
+                  </p:tgtEl>
+                </p:cond>
+              </p:prevCondLst>
+              <p:nextCondLst>
+                <p:cond evt="onNext" delay="0">
+                  <p:tgtEl>
+                    <p:sldTgt/>
+                  </p:tgtEl>
+                </p:cond>
+              </p:nextCondLst>
+            </p:seq>
+          </p:childTnLst>
+        </p:cTn>
+      </p:par>
+    </p:tnLst>
+  </p:timing>
+</p:sld>
+</file>
+
+<file path=ppt/slides/slide7.xml><?xml version="1.0" encoding="utf-8"?>
 <p:sld xmlns:a="http://schemas.openxmlformats.org/drawingml/2006/main" xmlns:r="http://schemas.openxmlformats.org/officeDocument/2006/relationships" xmlns:p="http://schemas.openxmlformats.org/presentationml/2006/main">
   <p:cSld>
     <p:spTree>

</xml_diff>